<commit_message>
Update schemas of MEJ Firmware tutorial
</commit_message>
<xml_diff>
--- a/Tutorials/images/platform-build_workflow.pptx
+++ b/Tutorials/images/platform-build_workflow.pptx
@@ -138,11 +138,7 @@
 <file path=ppt/commentAuthors.xml><?xml version="1.0" encoding="utf-8"?>
 <p:cmAuthorLst xmlns:a="http://schemas.openxmlformats.org/drawingml/2006/main" xmlns:r="http://schemas.openxmlformats.org/officeDocument/2006/relationships" xmlns:p="http://schemas.openxmlformats.org/presentationml/2006/main">
   <p:cmAuthor id="1" name="Jérôme Leroux" initials="JL" lastIdx="10" clrIdx="0">
-    <p:extLst>
-      <p:ext uri="{19B8F6BF-5375-455C-9EA6-DF929625EA0E}">
-        <p15:presenceInfo xmlns:p15="http://schemas.microsoft.com/office/powerpoint/2012/main" userId="be9668c8704a2840" providerId="Windows Live"/>
-      </p:ext>
-    </p:extLst>
+    <p:extLst/>
   </p:cmAuthor>
   <p:cmAuthor id="2" name="Rémy Louedec" initials="" lastIdx="0" clrIdx="1"/>
 </p:cmAuthorLst>
@@ -240,7 +236,7 @@
               <a:rPr lang="fr-FR" smtClean="0">
                 <a:latin typeface="Calibri Regular" charset="0"/>
               </a:rPr>
-              <a:t>28/09/2020</a:t>
+              <a:t>29/09/2020</a:t>
             </a:fld>
             <a:endParaRPr lang="en-US" dirty="0">
               <a:latin typeface="Calibri Regular" charset="0"/>
@@ -428,7 +424,7 @@
           <a:p>
             <a:fld id="{D125E8DA-58CB-F841-A404-E11EC1E2C988}" type="datetime1">
               <a:rPr lang="fr-FR" smtClean="0"/>
-              <a:t>28/09/2020</a:t>
+              <a:t>29/09/2020</a:t>
             </a:fld>
             <a:endParaRPr lang="en-US" dirty="0"/>
           </a:p>
@@ -810,7 +806,7 @@
           <a:p>
             <a:fld id="{D125E8DA-58CB-F841-A404-E11EC1E2C988}" type="datetime1">
               <a:rPr lang="fr-FR" smtClean="0"/>
-              <a:t>28/09/2020</a:t>
+              <a:t>29/09/2020</a:t>
             </a:fld>
             <a:endParaRPr lang="en-US" dirty="0"/>
           </a:p>
@@ -28204,7 +28200,7 @@
           <p:cNvPr id="14" name="Slide Number Placeholder 5">
             <a:extLst>
               <a:ext uri="{FF2B5EF4-FFF2-40B4-BE49-F238E27FC236}">
-                <a16:creationId xmlns:a16="http://schemas.microsoft.com/office/drawing/2014/main" id="{D6A5EA0A-9DA9-564F-8F7D-CF263DB84C39}"/>
+                <a16:creationId xmlns:a16="http://schemas.microsoft.com/office/drawing/2014/main" xmlns="" id="{D6A5EA0A-9DA9-564F-8F7D-CF263DB84C39}"/>
               </a:ext>
             </a:extLst>
           </p:cNvPr>
@@ -28372,7 +28368,7 @@
           <p:cNvPr id="21" name="Straight Connector 20">
             <a:extLst>
               <a:ext uri="{FF2B5EF4-FFF2-40B4-BE49-F238E27FC236}">
-                <a16:creationId xmlns:a16="http://schemas.microsoft.com/office/drawing/2014/main" id="{F4443C96-B82D-F449-A71B-02134B6BB207}"/>
+                <a16:creationId xmlns:a16="http://schemas.microsoft.com/office/drawing/2014/main" xmlns="" id="{F4443C96-B82D-F449-A71B-02134B6BB207}"/>
               </a:ext>
             </a:extLst>
           </p:cNvPr>
@@ -29038,7 +29034,7 @@
           <p:cNvPr id="14" name="Slide Number Placeholder 5">
             <a:extLst>
               <a:ext uri="{FF2B5EF4-FFF2-40B4-BE49-F238E27FC236}">
-                <a16:creationId xmlns:a16="http://schemas.microsoft.com/office/drawing/2014/main" id="{D6A5EA0A-9DA9-564F-8F7D-CF263DB84C39}"/>
+                <a16:creationId xmlns:a16="http://schemas.microsoft.com/office/drawing/2014/main" xmlns="" id="{D6A5EA0A-9DA9-564F-8F7D-CF263DB84C39}"/>
               </a:ext>
             </a:extLst>
           </p:cNvPr>
@@ -29206,7 +29202,7 @@
           <p:cNvPr id="21" name="Straight Connector 20">
             <a:extLst>
               <a:ext uri="{FF2B5EF4-FFF2-40B4-BE49-F238E27FC236}">
-                <a16:creationId xmlns:a16="http://schemas.microsoft.com/office/drawing/2014/main" id="{F4443C96-B82D-F449-A71B-02134B6BB207}"/>
+                <a16:creationId xmlns:a16="http://schemas.microsoft.com/office/drawing/2014/main" xmlns="" id="{F4443C96-B82D-F449-A71B-02134B6BB207}"/>
               </a:ext>
             </a:extLst>
           </p:cNvPr>
@@ -29292,7 +29288,7 @@
           <p:cNvPr id="6" name="Slide Number Placeholder 5">
             <a:extLst>
               <a:ext uri="{FF2B5EF4-FFF2-40B4-BE49-F238E27FC236}">
-                <a16:creationId xmlns:a16="http://schemas.microsoft.com/office/drawing/2014/main" id="{D6A5EA0A-9DA9-564F-8F7D-CF263DB84C39}"/>
+                <a16:creationId xmlns:a16="http://schemas.microsoft.com/office/drawing/2014/main" xmlns="" id="{D6A5EA0A-9DA9-564F-8F7D-CF263DB84C39}"/>
               </a:ext>
             </a:extLst>
           </p:cNvPr>
@@ -29460,7 +29456,7 @@
           <p:cNvPr id="8" name="Straight Connector 7">
             <a:extLst>
               <a:ext uri="{FF2B5EF4-FFF2-40B4-BE49-F238E27FC236}">
-                <a16:creationId xmlns:a16="http://schemas.microsoft.com/office/drawing/2014/main" id="{F4443C96-B82D-F449-A71B-02134B6BB207}"/>
+                <a16:creationId xmlns:a16="http://schemas.microsoft.com/office/drawing/2014/main" xmlns="" id="{F4443C96-B82D-F449-A71B-02134B6BB207}"/>
               </a:ext>
             </a:extLst>
           </p:cNvPr>
@@ -30294,7 +30290,7 @@
           <p:cNvPr id="14" name="Slide Number Placeholder 5">
             <a:extLst>
               <a:ext uri="{FF2B5EF4-FFF2-40B4-BE49-F238E27FC236}">
-                <a16:creationId xmlns:a16="http://schemas.microsoft.com/office/drawing/2014/main" id="{D6A5EA0A-9DA9-564F-8F7D-CF263DB84C39}"/>
+                <a16:creationId xmlns:a16="http://schemas.microsoft.com/office/drawing/2014/main" xmlns="" id="{D6A5EA0A-9DA9-564F-8F7D-CF263DB84C39}"/>
               </a:ext>
             </a:extLst>
           </p:cNvPr>
@@ -30462,7 +30458,7 @@
           <p:cNvPr id="21" name="Straight Connector 20">
             <a:extLst>
               <a:ext uri="{FF2B5EF4-FFF2-40B4-BE49-F238E27FC236}">
-                <a16:creationId xmlns:a16="http://schemas.microsoft.com/office/drawing/2014/main" id="{F4443C96-B82D-F449-A71B-02134B6BB207}"/>
+                <a16:creationId xmlns:a16="http://schemas.microsoft.com/office/drawing/2014/main" xmlns="" id="{F4443C96-B82D-F449-A71B-02134B6BB207}"/>
               </a:ext>
             </a:extLst>
           </p:cNvPr>
@@ -30548,7 +30544,7 @@
           <p:cNvPr id="6" name="Slide Number Placeholder 5">
             <a:extLst>
               <a:ext uri="{FF2B5EF4-FFF2-40B4-BE49-F238E27FC236}">
-                <a16:creationId xmlns:a16="http://schemas.microsoft.com/office/drawing/2014/main" id="{D6A5EA0A-9DA9-564F-8F7D-CF263DB84C39}"/>
+                <a16:creationId xmlns:a16="http://schemas.microsoft.com/office/drawing/2014/main" xmlns="" id="{D6A5EA0A-9DA9-564F-8F7D-CF263DB84C39}"/>
               </a:ext>
             </a:extLst>
           </p:cNvPr>
@@ -30716,7 +30712,7 @@
           <p:cNvPr id="8" name="Straight Connector 7">
             <a:extLst>
               <a:ext uri="{FF2B5EF4-FFF2-40B4-BE49-F238E27FC236}">
-                <a16:creationId xmlns:a16="http://schemas.microsoft.com/office/drawing/2014/main" id="{F4443C96-B82D-F449-A71B-02134B6BB207}"/>
+                <a16:creationId xmlns:a16="http://schemas.microsoft.com/office/drawing/2014/main" xmlns="" id="{F4443C96-B82D-F449-A71B-02134B6BB207}"/>
               </a:ext>
             </a:extLst>
           </p:cNvPr>
@@ -31550,7 +31546,7 @@
           <p:cNvPr id="14" name="Slide Number Placeholder 5">
             <a:extLst>
               <a:ext uri="{FF2B5EF4-FFF2-40B4-BE49-F238E27FC236}">
-                <a16:creationId xmlns:a16="http://schemas.microsoft.com/office/drawing/2014/main" id="{D6A5EA0A-9DA9-564F-8F7D-CF263DB84C39}"/>
+                <a16:creationId xmlns:a16="http://schemas.microsoft.com/office/drawing/2014/main" xmlns="" id="{D6A5EA0A-9DA9-564F-8F7D-CF263DB84C39}"/>
               </a:ext>
             </a:extLst>
           </p:cNvPr>
@@ -31718,7 +31714,7 @@
           <p:cNvPr id="21" name="Straight Connector 20">
             <a:extLst>
               <a:ext uri="{FF2B5EF4-FFF2-40B4-BE49-F238E27FC236}">
-                <a16:creationId xmlns:a16="http://schemas.microsoft.com/office/drawing/2014/main" id="{F4443C96-B82D-F449-A71B-02134B6BB207}"/>
+                <a16:creationId xmlns:a16="http://schemas.microsoft.com/office/drawing/2014/main" xmlns="" id="{F4443C96-B82D-F449-A71B-02134B6BB207}"/>
               </a:ext>
             </a:extLst>
           </p:cNvPr>
@@ -31804,7 +31800,7 @@
           <p:cNvPr id="6" name="Slide Number Placeholder 5">
             <a:extLst>
               <a:ext uri="{FF2B5EF4-FFF2-40B4-BE49-F238E27FC236}">
-                <a16:creationId xmlns:a16="http://schemas.microsoft.com/office/drawing/2014/main" id="{D6A5EA0A-9DA9-564F-8F7D-CF263DB84C39}"/>
+                <a16:creationId xmlns:a16="http://schemas.microsoft.com/office/drawing/2014/main" xmlns="" id="{D6A5EA0A-9DA9-564F-8F7D-CF263DB84C39}"/>
               </a:ext>
             </a:extLst>
           </p:cNvPr>
@@ -31972,7 +31968,7 @@
           <p:cNvPr id="8" name="Straight Connector 7">
             <a:extLst>
               <a:ext uri="{FF2B5EF4-FFF2-40B4-BE49-F238E27FC236}">
-                <a16:creationId xmlns:a16="http://schemas.microsoft.com/office/drawing/2014/main" id="{F4443C96-B82D-F449-A71B-02134B6BB207}"/>
+                <a16:creationId xmlns:a16="http://schemas.microsoft.com/office/drawing/2014/main" xmlns="" id="{F4443C96-B82D-F449-A71B-02134B6BB207}"/>
               </a:ext>
             </a:extLst>
           </p:cNvPr>
@@ -32844,418 +32840,33 @@
       </p:sp>
       <p:grpSp>
         <p:nvGrpSpPr>
-          <p:cNvPr id="161" name="Group 160"/>
+          <p:cNvPr id="6" name="Group 5"/>
           <p:cNvGrpSpPr/>
           <p:nvPr/>
         </p:nvGrpSpPr>
         <p:grpSpPr>
           <a:xfrm>
-            <a:off x="4014325" y="1909144"/>
-            <a:ext cx="2095581" cy="687412"/>
-            <a:chOff x="4007768" y="1909144"/>
-            <a:chExt cx="2095581" cy="687412"/>
+            <a:off x="1749883" y="1816759"/>
+            <a:ext cx="8767312" cy="4328421"/>
+            <a:chOff x="1749883" y="1816759"/>
+            <a:chExt cx="8767312" cy="4328421"/>
           </a:xfrm>
         </p:grpSpPr>
         <p:sp>
           <p:nvSpPr>
-            <p:cNvPr id="65" name="Rectangle 64"/>
+            <p:cNvPr id="71" name="Rounded Rectangle 70"/>
             <p:cNvSpPr/>
             <p:nvPr/>
           </p:nvSpPr>
           <p:spPr>
             <a:xfrm>
-              <a:off x="4080149" y="1937756"/>
-              <a:ext cx="2023200" cy="658800"/>
+              <a:off x="3592579" y="4694895"/>
+              <a:ext cx="5219031" cy="1450285"/>
             </a:xfrm>
-            <a:prstGeom prst="rect">
-              <a:avLst/>
-            </a:prstGeom>
-            <a:solidFill>
-              <a:schemeClr val="accent4"/>
-            </a:solidFill>
-            <a:ln>
-              <a:noFill/>
-            </a:ln>
-            <a:effectLst/>
-          </p:spPr>
-          <p:style>
-            <a:lnRef idx="2">
-              <a:schemeClr val="dk1">
-                <a:shade val="50000"/>
-              </a:schemeClr>
-            </a:lnRef>
-            <a:fillRef idx="1">
-              <a:schemeClr val="dk1"/>
-            </a:fillRef>
-            <a:effectRef idx="0">
-              <a:schemeClr val="dk1"/>
-            </a:effectRef>
-            <a:fontRef idx="minor">
-              <a:schemeClr val="lt1"/>
-            </a:fontRef>
-          </p:style>
-          <p:txBody>
-            <a:bodyPr rtlCol="0" anchor="ctr"/>
-            <a:lstStyle/>
-            <a:p>
-              <a:pPr algn="ctr">
-                <a:defRPr/>
-              </a:pPr>
-              <a:r>
-                <a:rPr lang="en-US" sz="1000" b="1" dirty="0">
-                  <a:solidFill>
-                    <a:srgbClr val="FFFFFF"/>
-                  </a:solidFill>
-                  <a:cs typeface="Arial" panose="020B0604020202020204" pitchFamily="34" charset="0"/>
-                </a:rPr>
-                <a:t>Foundation libraries </a:t>
-              </a:r>
-              <a:br>
-                <a:rPr lang="en-US" sz="1000" b="1" dirty="0">
-                  <a:solidFill>
-                    <a:srgbClr val="FFFFFF"/>
-                  </a:solidFill>
-                  <a:cs typeface="Arial" panose="020B0604020202020204" pitchFamily="34" charset="0"/>
-                </a:rPr>
-              </a:br>
-              <a:r>
-                <a:rPr lang="en-US" sz="1000" dirty="0">
-                  <a:solidFill>
-                    <a:srgbClr val="FFFFFF"/>
-                  </a:solidFill>
-                  <a:cs typeface="Arial" panose="020B0604020202020204" pitchFamily="34" charset="0"/>
-                </a:rPr>
-                <a:t>Java</a:t>
-              </a:r>
-            </a:p>
-          </p:txBody>
-        </p:sp>
-        <p:sp>
-          <p:nvSpPr>
-            <p:cNvPr id="68" name="Bande diagonale 192"/>
-            <p:cNvSpPr/>
-            <p:nvPr/>
-          </p:nvSpPr>
-          <p:spPr>
-            <a:xfrm>
-              <a:off x="4080147" y="1937756"/>
-              <a:ext cx="279828" cy="279828"/>
-            </a:xfrm>
-            <a:prstGeom prst="diagStripe">
+            <a:prstGeom prst="roundRect">
               <a:avLst>
-                <a:gd name="adj" fmla="val 41991"/>
+                <a:gd name="adj" fmla="val 6304"/>
               </a:avLst>
-            </a:prstGeom>
-            <a:solidFill>
-              <a:schemeClr val="accent5">
-                <a:lumMod val="75000"/>
-              </a:schemeClr>
-            </a:solidFill>
-            <a:ln>
-              <a:noFill/>
-            </a:ln>
-          </p:spPr>
-          <p:style>
-            <a:lnRef idx="2">
-              <a:schemeClr val="accent1">
-                <a:shade val="50000"/>
-              </a:schemeClr>
-            </a:lnRef>
-            <a:fillRef idx="1">
-              <a:schemeClr val="accent1"/>
-            </a:fillRef>
-            <a:effectRef idx="0">
-              <a:schemeClr val="accent1"/>
-            </a:effectRef>
-            <a:fontRef idx="minor">
-              <a:schemeClr val="lt1"/>
-            </a:fontRef>
-          </p:style>
-          <p:txBody>
-            <a:bodyPr rtlCol="0" anchor="ctr"/>
-            <a:lstStyle/>
-            <a:p>
-              <a:pPr algn="ctr">
-                <a:defRPr/>
-              </a:pPr>
-              <a:endParaRPr lang="en-US" dirty="0">
-                <a:solidFill>
-                  <a:srgbClr val="FFFFFF"/>
-                </a:solidFill>
-              </a:endParaRPr>
-            </a:p>
-          </p:txBody>
-        </p:sp>
-        <p:sp>
-          <p:nvSpPr>
-            <p:cNvPr id="69" name="ZoneTexte 182"/>
-            <p:cNvSpPr txBox="1"/>
-            <p:nvPr/>
-          </p:nvSpPr>
-          <p:spPr>
-            <a:xfrm rot="18945775">
-              <a:off x="4007768" y="1909144"/>
-              <a:ext cx="317716" cy="230832"/>
-            </a:xfrm>
-            <a:prstGeom prst="rect">
-              <a:avLst/>
-            </a:prstGeom>
-            <a:noFill/>
-          </p:spPr>
-          <p:txBody>
-            <a:bodyPr wrap="none" rtlCol="0">
-              <a:spAutoFit/>
-            </a:bodyPr>
-            <a:lstStyle/>
-            <a:p>
-              <a:pPr>
-                <a:defRPr/>
-              </a:pPr>
-              <a:r>
-                <a:rPr lang="en-US" sz="900" dirty="0" err="1">
-                  <a:solidFill>
-                    <a:srgbClr val="FFFFFF"/>
-                  </a:solidFill>
-                </a:rPr>
-                <a:t>src</a:t>
-              </a:r>
-              <a:endParaRPr lang="en-US" sz="900" dirty="0">
-                <a:solidFill>
-                  <a:srgbClr val="FFFFFF"/>
-                </a:solidFill>
-              </a:endParaRPr>
-            </a:p>
-          </p:txBody>
-        </p:sp>
-      </p:grpSp>
-      <p:grpSp>
-        <p:nvGrpSpPr>
-          <p:cNvPr id="147" name="Group 146"/>
-          <p:cNvGrpSpPr/>
-          <p:nvPr/>
-        </p:nvGrpSpPr>
-        <p:grpSpPr>
-          <a:xfrm>
-            <a:off x="6216968" y="1909144"/>
-            <a:ext cx="2098600" cy="682288"/>
-            <a:chOff x="7491600" y="1909144"/>
-            <a:chExt cx="2098600" cy="682288"/>
-          </a:xfrm>
-        </p:grpSpPr>
-        <p:sp>
-          <p:nvSpPr>
-            <p:cNvPr id="70" name="Rectangle 69">
-              <a:extLst>
-                <a:ext uri="{FF2B5EF4-FFF2-40B4-BE49-F238E27FC236}">
-                  <a16:creationId xmlns:a16="http://schemas.microsoft.com/office/drawing/2014/main" id="{A3B9DB16-F465-4058-B983-18AC8FD15120}"/>
-                </a:ext>
-              </a:extLst>
-            </p:cNvPr>
-            <p:cNvSpPr/>
-            <p:nvPr/>
-          </p:nvSpPr>
-          <p:spPr>
-            <a:xfrm>
-              <a:off x="7567000" y="1932632"/>
-              <a:ext cx="2023200" cy="658800"/>
-            </a:xfrm>
-            <a:prstGeom prst="rect">
-              <a:avLst/>
-            </a:prstGeom>
-            <a:solidFill>
-              <a:schemeClr val="accent2"/>
-            </a:solidFill>
-            <a:ln>
-              <a:noFill/>
-            </a:ln>
-            <a:effectLst/>
-          </p:spPr>
-          <p:style>
-            <a:lnRef idx="2">
-              <a:schemeClr val="dk1">
-                <a:shade val="50000"/>
-              </a:schemeClr>
-            </a:lnRef>
-            <a:fillRef idx="1">
-              <a:schemeClr val="dk1"/>
-            </a:fillRef>
-            <a:effectRef idx="0">
-              <a:schemeClr val="dk1"/>
-            </a:effectRef>
-            <a:fontRef idx="minor">
-              <a:schemeClr val="lt1"/>
-            </a:fontRef>
-          </p:style>
-          <p:txBody>
-            <a:bodyPr rtlCol="0" anchor="ctr"/>
-            <a:lstStyle/>
-            <a:p>
-              <a:pPr algn="ctr">
-                <a:defRPr/>
-              </a:pPr>
-              <a:r>
-                <a:rPr lang="en-US" sz="1000" b="1" dirty="0">
-                  <a:solidFill>
-                    <a:srgbClr val="FFFFFF"/>
-                  </a:solidFill>
-                  <a:cs typeface="Arial" panose="020B0604020202020204" pitchFamily="34" charset="0"/>
-                </a:rPr>
-                <a:t>Foundation libraries Mockups</a:t>
-              </a:r>
-            </a:p>
-            <a:p>
-              <a:pPr algn="ctr">
-                <a:defRPr/>
-              </a:pPr>
-              <a:r>
-                <a:rPr lang="en-US" sz="1000" dirty="0">
-                  <a:solidFill>
-                    <a:srgbClr val="FFFFFF"/>
-                  </a:solidFill>
-                  <a:cs typeface="Arial" panose="020B0604020202020204" pitchFamily="34" charset="0"/>
-                </a:rPr>
-                <a:t>Java/C</a:t>
-              </a:r>
-            </a:p>
-          </p:txBody>
-        </p:sp>
-        <p:sp>
-          <p:nvSpPr>
-            <p:cNvPr id="71" name="Bande diagonale 191">
-              <a:extLst>
-                <a:ext uri="{FF2B5EF4-FFF2-40B4-BE49-F238E27FC236}">
-                  <a16:creationId xmlns:a16="http://schemas.microsoft.com/office/drawing/2014/main" id="{DAA7A729-6342-4FAC-9943-95D96FF2DD80}"/>
-                </a:ext>
-              </a:extLst>
-            </p:cNvPr>
-            <p:cNvSpPr/>
-            <p:nvPr/>
-          </p:nvSpPr>
-          <p:spPr>
-            <a:xfrm>
-              <a:off x="7567200" y="1932631"/>
-              <a:ext cx="279828" cy="279828"/>
-            </a:xfrm>
-            <a:prstGeom prst="diagStripe">
-              <a:avLst>
-                <a:gd name="adj" fmla="val 41991"/>
-              </a:avLst>
-            </a:prstGeom>
-            <a:solidFill>
-              <a:schemeClr val="accent2">
-                <a:lumMod val="75000"/>
-              </a:schemeClr>
-            </a:solidFill>
-            <a:ln>
-              <a:noFill/>
-            </a:ln>
-          </p:spPr>
-          <p:style>
-            <a:lnRef idx="2">
-              <a:schemeClr val="accent1">
-                <a:shade val="50000"/>
-              </a:schemeClr>
-            </a:lnRef>
-            <a:fillRef idx="1">
-              <a:schemeClr val="accent1"/>
-            </a:fillRef>
-            <a:effectRef idx="0">
-              <a:schemeClr val="accent1"/>
-            </a:effectRef>
-            <a:fontRef idx="minor">
-              <a:schemeClr val="lt1"/>
-            </a:fontRef>
-          </p:style>
-          <p:txBody>
-            <a:bodyPr rtlCol="0" anchor="ctr"/>
-            <a:lstStyle/>
-            <a:p>
-              <a:pPr algn="ctr">
-                <a:defRPr/>
-              </a:pPr>
-              <a:endParaRPr lang="en-US" dirty="0">
-                <a:solidFill>
-                  <a:srgbClr val="FFFFFF"/>
-                </a:solidFill>
-              </a:endParaRPr>
-            </a:p>
-          </p:txBody>
-        </p:sp>
-        <p:sp>
-          <p:nvSpPr>
-            <p:cNvPr id="72" name="ZoneTexte 180">
-              <a:extLst>
-                <a:ext uri="{FF2B5EF4-FFF2-40B4-BE49-F238E27FC236}">
-                  <a16:creationId xmlns:a16="http://schemas.microsoft.com/office/drawing/2014/main" id="{5BB884F8-E56F-40DE-BF31-76BF3D0D1275}"/>
-                </a:ext>
-              </a:extLst>
-            </p:cNvPr>
-            <p:cNvSpPr txBox="1"/>
-            <p:nvPr/>
-          </p:nvSpPr>
-          <p:spPr>
-            <a:xfrm rot="18945775">
-              <a:off x="7491600" y="1909144"/>
-              <a:ext cx="317716" cy="230832"/>
-            </a:xfrm>
-            <a:prstGeom prst="rect">
-              <a:avLst/>
-            </a:prstGeom>
-            <a:noFill/>
-          </p:spPr>
-          <p:txBody>
-            <a:bodyPr wrap="none" rtlCol="0">
-              <a:spAutoFit/>
-            </a:bodyPr>
-            <a:lstStyle/>
-            <a:p>
-              <a:pPr>
-                <a:defRPr/>
-              </a:pPr>
-              <a:r>
-                <a:rPr lang="en-US" sz="900" dirty="0" err="1">
-                  <a:solidFill>
-                    <a:srgbClr val="FFFFFF"/>
-                  </a:solidFill>
-                </a:rPr>
-                <a:t>src</a:t>
-              </a:r>
-              <a:endParaRPr lang="en-US" sz="900" dirty="0">
-                <a:solidFill>
-                  <a:srgbClr val="FFFFFF"/>
-                </a:solidFill>
-              </a:endParaRPr>
-            </a:p>
-          </p:txBody>
-        </p:sp>
-      </p:grpSp>
-      <p:grpSp>
-        <p:nvGrpSpPr>
-          <p:cNvPr id="159" name="Group 158"/>
-          <p:cNvGrpSpPr/>
-          <p:nvPr/>
-        </p:nvGrpSpPr>
-        <p:grpSpPr>
-          <a:xfrm>
-            <a:off x="1748718" y="1909144"/>
-            <a:ext cx="2158545" cy="689680"/>
-            <a:chOff x="1748718" y="1909144"/>
-            <a:chExt cx="2158545" cy="689680"/>
-          </a:xfrm>
-        </p:grpSpPr>
-        <p:sp>
-          <p:nvSpPr>
-            <p:cNvPr id="64" name="Rectangle 63"/>
-            <p:cNvSpPr/>
-            <p:nvPr/>
-          </p:nvSpPr>
-          <p:spPr>
-            <a:xfrm>
-              <a:off x="1884266" y="1932724"/>
-              <a:ext cx="2022997" cy="658800"/>
-            </a:xfrm>
-            <a:prstGeom prst="rect">
-              <a:avLst/>
             </a:prstGeom>
             <a:solidFill>
               <a:schemeClr val="accent1"/>
@@ -33289,67 +32900,150 @@
                 <a:defRPr/>
               </a:pPr>
               <a:r>
-                <a:rPr lang="en-US" sz="1000" b="1" dirty="0">
+                <a:rPr lang="en-US" sz="1000" dirty="0" smtClean="0">
                   <a:solidFill>
                     <a:srgbClr val="FFFFFF"/>
                   </a:solidFill>
-                  <a:cs typeface="Arial" panose="020B0604020202020204" pitchFamily="34" charset="0"/>
+                  <a:latin typeface="Source Sans Pro Light" charset="0"/>
+                  <a:ea typeface="Source Sans Pro Light" charset="0"/>
+                  <a:cs typeface="Source Sans Pro Light" charset="0"/>
                 </a:rPr>
-                <a:t>MicroEJ Architecture </a:t>
+                <a:t/>
               </a:r>
+              <a:br>
+                <a:rPr lang="en-US" sz="1000" dirty="0" smtClean="0">
+                  <a:solidFill>
+                    <a:srgbClr val="FFFFFF"/>
+                  </a:solidFill>
+                  <a:latin typeface="Source Sans Pro Light" charset="0"/>
+                  <a:ea typeface="Source Sans Pro Light" charset="0"/>
+                  <a:cs typeface="Source Sans Pro Light" charset="0"/>
+                </a:rPr>
+              </a:br>
+              <a:r>
+                <a:rPr lang="en-US" sz="1000" dirty="0" smtClean="0">
+                  <a:solidFill>
+                    <a:srgbClr val="FFFFFF"/>
+                  </a:solidFill>
+                  <a:latin typeface="Source Sans Pro Light" charset="0"/>
+                  <a:ea typeface="Source Sans Pro Light" charset="0"/>
+                  <a:cs typeface="Source Sans Pro Light" charset="0"/>
+                </a:rPr>
+                <a:t/>
+              </a:r>
+              <a:br>
+                <a:rPr lang="en-US" sz="1000" dirty="0" smtClean="0">
+                  <a:solidFill>
+                    <a:srgbClr val="FFFFFF"/>
+                  </a:solidFill>
+                  <a:latin typeface="Source Sans Pro Light" charset="0"/>
+                  <a:ea typeface="Source Sans Pro Light" charset="0"/>
+                  <a:cs typeface="Source Sans Pro Light" charset="0"/>
+                </a:rPr>
+              </a:br>
+              <a:r>
+                <a:rPr lang="en-US" sz="1000" dirty="0" smtClean="0">
+                  <a:solidFill>
+                    <a:srgbClr val="FFFFFF"/>
+                  </a:solidFill>
+                  <a:latin typeface="Source Sans Pro Light" charset="0"/>
+                  <a:ea typeface="Source Sans Pro Light" charset="0"/>
+                  <a:cs typeface="Source Sans Pro Light" charset="0"/>
+                </a:rPr>
+                <a:t/>
+              </a:r>
+              <a:br>
+                <a:rPr lang="en-US" sz="1000" dirty="0" smtClean="0">
+                  <a:solidFill>
+                    <a:srgbClr val="FFFFFF"/>
+                  </a:solidFill>
+                  <a:latin typeface="Source Sans Pro Light" charset="0"/>
+                  <a:ea typeface="Source Sans Pro Light" charset="0"/>
+                  <a:cs typeface="Source Sans Pro Light" charset="0"/>
+                </a:rPr>
+              </a:br>
+              <a:r>
+                <a:rPr lang="en-US" sz="1000" dirty="0" smtClean="0">
+                  <a:solidFill>
+                    <a:srgbClr val="FFFFFF"/>
+                  </a:solidFill>
+                  <a:latin typeface="Source Sans Pro Light" charset="0"/>
+                  <a:ea typeface="Source Sans Pro Light" charset="0"/>
+                  <a:cs typeface="Source Sans Pro Light" charset="0"/>
+                </a:rPr>
+                <a:t/>
+              </a:r>
+              <a:br>
+                <a:rPr lang="en-US" sz="1000" dirty="0" smtClean="0">
+                  <a:solidFill>
+                    <a:srgbClr val="FFFFFF"/>
+                  </a:solidFill>
+                  <a:latin typeface="Source Sans Pro Light" charset="0"/>
+                  <a:ea typeface="Source Sans Pro Light" charset="0"/>
+                  <a:cs typeface="Source Sans Pro Light" charset="0"/>
+                </a:rPr>
+              </a:br>
+              <a:endParaRPr lang="en-US" sz="1000" dirty="0" smtClean="0">
+                <a:solidFill>
+                  <a:srgbClr val="FFFFFF"/>
+                </a:solidFill>
+                <a:latin typeface="Source Sans Pro Light" charset="0"/>
+                <a:ea typeface="Source Sans Pro Light" charset="0"/>
+                <a:cs typeface="Source Sans Pro Light" charset="0"/>
+              </a:endParaRPr>
             </a:p>
             <a:p>
               <a:pPr algn="ctr">
                 <a:defRPr/>
               </a:pPr>
-              <a:r>
-                <a:rPr lang="en-US" sz="1000" dirty="0">
-                  <a:solidFill>
-                    <a:srgbClr val="FFFFFF"/>
-                  </a:solidFill>
-                  <a:cs typeface="Arial" panose="020B0604020202020204" pitchFamily="34" charset="0"/>
-                </a:rPr>
-                <a:t>(MEJ32 Core + Built-in Foundation Libraries + Simulator + Mockups)</a:t>
-              </a:r>
+              <a:endParaRPr lang="en-US" sz="1000" dirty="0" smtClean="0">
+                <a:solidFill>
+                  <a:srgbClr val="FFFFFF"/>
+                </a:solidFill>
+                <a:latin typeface="Source Sans Pro Light" charset="0"/>
+                <a:ea typeface="Source Sans Pro Light" charset="0"/>
+                <a:cs typeface="Source Sans Pro Light" charset="0"/>
+              </a:endParaRPr>
             </a:p>
           </p:txBody>
         </p:sp>
         <p:sp>
           <p:nvSpPr>
-            <p:cNvPr id="66" name="Bande diagonale 37"/>
+            <p:cNvPr id="96" name="Rounded Rectangle 95"/>
             <p:cNvSpPr/>
             <p:nvPr/>
           </p:nvSpPr>
           <p:spPr>
             <a:xfrm>
-              <a:off x="1888309" y="1932723"/>
-              <a:ext cx="279828" cy="279828"/>
+              <a:off x="6344511" y="5008817"/>
+              <a:ext cx="1057233" cy="962893"/>
             </a:xfrm>
-            <a:prstGeom prst="diagStripe">
+            <a:prstGeom prst="roundRect">
               <a:avLst>
-                <a:gd name="adj" fmla="val 41991"/>
+                <a:gd name="adj" fmla="val 7525"/>
               </a:avLst>
             </a:prstGeom>
             <a:solidFill>
-              <a:schemeClr val="accent1">
-                <a:lumMod val="75000"/>
-              </a:schemeClr>
+              <a:schemeClr val="accent2"/>
             </a:solidFill>
-            <a:ln>
-              <a:noFill/>
+            <a:ln w="9525">
+              <a:solidFill>
+                <a:schemeClr val="bg1"/>
+              </a:solidFill>
             </a:ln>
+            <a:effectLst/>
           </p:spPr>
           <p:style>
             <a:lnRef idx="2">
-              <a:schemeClr val="accent1">
+              <a:schemeClr val="dk1">
                 <a:shade val="50000"/>
               </a:schemeClr>
             </a:lnRef>
             <a:fillRef idx="1">
-              <a:schemeClr val="accent1"/>
+              <a:schemeClr val="dk1"/>
             </a:fillRef>
             <a:effectRef idx="0">
-              <a:schemeClr val="accent1"/>
+              <a:schemeClr val="dk1"/>
             </a:effectRef>
             <a:fontRef idx="minor">
               <a:schemeClr val="lt1"/>
@@ -33362,891 +33056,277 @@
               <a:pPr algn="ctr">
                 <a:defRPr/>
               </a:pPr>
-              <a:endParaRPr lang="en-US" dirty="0">
-                <a:solidFill>
-                  <a:srgbClr val="FFFFFF"/>
-                </a:solidFill>
-              </a:endParaRPr>
-            </a:p>
-          </p:txBody>
-        </p:sp>
-        <p:sp>
-          <p:nvSpPr>
-            <p:cNvPr id="67" name="ZoneTexte 178"/>
-            <p:cNvSpPr txBox="1"/>
-            <p:nvPr/>
-          </p:nvSpPr>
-          <p:spPr>
-            <a:xfrm rot="18945775">
-              <a:off x="1830135" y="1909144"/>
-              <a:ext cx="333746" cy="230832"/>
-            </a:xfrm>
-            <a:prstGeom prst="rect">
-              <a:avLst/>
-            </a:prstGeom>
-            <a:noFill/>
-          </p:spPr>
-          <p:txBody>
-            <a:bodyPr wrap="none" rtlCol="0">
-              <a:spAutoFit/>
-            </a:bodyPr>
-            <a:lstStyle/>
-            <a:p>
-              <a:pPr>
-                <a:defRPr/>
-              </a:pPr>
               <a:r>
-                <a:rPr lang="en-US" sz="900" dirty="0">
+                <a:rPr lang="en-US" sz="1000" dirty="0">
                   <a:solidFill>
                     <a:srgbClr val="FFFFFF"/>
                   </a:solidFill>
+                  <a:latin typeface="Source Sans Pro Light" charset="0"/>
+                  <a:ea typeface="Source Sans Pro Light" charset="0"/>
+                  <a:cs typeface="Source Sans Pro Light" charset="0"/>
                 </a:rPr>
-                <a:t>bin</a:t>
+                <a:t>Simulator + Mockups</a:t>
               </a:r>
+            </a:p>
+            <a:p>
+              <a:pPr algn="ctr">
+                <a:defRPr/>
+              </a:pPr>
               <a:endParaRPr lang="en-US" sz="1000" dirty="0">
                 <a:solidFill>
                   <a:srgbClr val="FFFFFF"/>
                 </a:solidFill>
+                <a:latin typeface="Source Sans Pro Light" charset="0"/>
+                <a:ea typeface="Source Sans Pro Light" charset="0"/>
+                <a:cs typeface="Source Sans Pro Light" charset="0"/>
+              </a:endParaRPr>
+            </a:p>
+            <a:p>
+              <a:pPr algn="ctr">
+                <a:defRPr/>
+              </a:pPr>
+              <a:endParaRPr lang="en-US" sz="1000" dirty="0">
+                <a:solidFill>
+                  <a:srgbClr val="FFFFFF"/>
+                </a:solidFill>
+                <a:latin typeface="Source Sans Pro Light" charset="0"/>
+                <a:ea typeface="Source Sans Pro Light" charset="0"/>
+                <a:cs typeface="Source Sans Pro Light" charset="0"/>
+              </a:endParaRPr>
+            </a:p>
+            <a:p>
+              <a:pPr algn="ctr">
+                <a:defRPr/>
+              </a:pPr>
+              <a:endParaRPr lang="en-US" sz="1000" dirty="0">
+                <a:solidFill>
+                  <a:srgbClr val="FFFFFF"/>
+                </a:solidFill>
+                <a:latin typeface="Source Sans Pro Light" charset="0"/>
+                <a:ea typeface="Source Sans Pro Light" charset="0"/>
+                <a:cs typeface="Source Sans Pro Light" charset="0"/>
               </a:endParaRPr>
             </a:p>
           </p:txBody>
         </p:sp>
         <p:pic>
           <p:nvPicPr>
-            <p:cNvPr id="73" name="Picture 72">
-              <a:extLst>
-                <a:ext uri="{FF2B5EF4-FFF2-40B4-BE49-F238E27FC236}">
-                  <a16:creationId xmlns:a16="http://schemas.microsoft.com/office/drawing/2014/main" id="{4F546C78-5E78-45EA-B60F-C12DF2A3E138}"/>
-                </a:ext>
-              </a:extLst>
-            </p:cNvPr>
+            <p:cNvPr id="57" name="Picture 56"/>
             <p:cNvPicPr>
               <a:picLocks noChangeAspect="1"/>
             </p:cNvPicPr>
             <p:nvPr/>
           </p:nvPicPr>
           <p:blipFill>
-            <a:blip r:embed="rId3"/>
+            <a:blip r:embed="rId3">
+              <a:extLst>
+                <a:ext uri="{28A0092B-C50C-407E-A947-70E740481C1C}">
+                  <a14:useLocalDpi xmlns:a14="http://schemas.microsoft.com/office/drawing/2010/main" val="0"/>
+                </a:ext>
+              </a:extLst>
+            </a:blip>
             <a:stretch>
               <a:fillRect/>
             </a:stretch>
           </p:blipFill>
           <p:spPr>
             <a:xfrm>
-              <a:off x="1748718" y="2309271"/>
-              <a:ext cx="289553" cy="289553"/>
+              <a:off x="6603896" y="5463172"/>
+              <a:ext cx="548333" cy="439095"/>
             </a:xfrm>
             <a:prstGeom prst="rect">
               <a:avLst/>
             </a:prstGeom>
           </p:spPr>
         </p:pic>
-      </p:grpSp>
-      <p:sp>
-        <p:nvSpPr>
-          <p:cNvPr id="77" name="Rectangle 76"/>
-          <p:cNvSpPr/>
-          <p:nvPr/>
-        </p:nvSpPr>
-        <p:spPr>
-          <a:xfrm>
-            <a:off x="1884266" y="3054895"/>
-            <a:ext cx="1691454" cy="360000"/>
-          </a:xfrm>
-          <a:prstGeom prst="rect">
-            <a:avLst/>
-          </a:prstGeom>
-          <a:solidFill>
-            <a:schemeClr val="tx2"/>
-          </a:solidFill>
-          <a:ln>
-            <a:noFill/>
-          </a:ln>
-          <a:effectLst/>
-        </p:spPr>
-        <p:style>
-          <a:lnRef idx="2">
-            <a:schemeClr val="dk1">
-              <a:shade val="50000"/>
-            </a:schemeClr>
-          </a:lnRef>
-          <a:fillRef idx="1">
-            <a:schemeClr val="dk1"/>
-          </a:fillRef>
-          <a:effectRef idx="0">
-            <a:schemeClr val="dk1"/>
-          </a:effectRef>
-          <a:fontRef idx="minor">
-            <a:schemeClr val="lt1"/>
-          </a:fontRef>
-        </p:style>
-        <p:txBody>
-          <a:bodyPr rtlCol="0" anchor="ctr"/>
-          <a:lstStyle/>
-          <a:p>
-            <a:pPr algn="ctr">
-              <a:defRPr/>
-            </a:pPr>
-            <a:r>
-              <a:rPr lang="en-US" sz="1000" b="1" dirty="0">
-                <a:solidFill>
-                  <a:srgbClr val="FFFFFF"/>
-                </a:solidFill>
-                <a:cs typeface="Arial" panose="020B0604020202020204" pitchFamily="34" charset="0"/>
-              </a:rPr>
-              <a:t>Platform  Configuration</a:t>
-            </a:r>
-          </a:p>
-        </p:txBody>
-      </p:sp>
-      <p:sp>
-        <p:nvSpPr>
-          <p:cNvPr id="78" name="Bande diagonale 193"/>
-          <p:cNvSpPr/>
-          <p:nvPr/>
-        </p:nvSpPr>
-        <p:spPr>
-          <a:xfrm>
-            <a:off x="1887423" y="3055869"/>
-            <a:ext cx="279828" cy="279828"/>
-          </a:xfrm>
-          <a:prstGeom prst="diagStripe">
-            <a:avLst>
-              <a:gd name="adj" fmla="val 41991"/>
-            </a:avLst>
-          </a:prstGeom>
-          <a:solidFill>
-            <a:schemeClr val="tx1">
-              <a:lumMod val="75000"/>
-            </a:schemeClr>
-          </a:solidFill>
-          <a:ln>
-            <a:noFill/>
-          </a:ln>
-        </p:spPr>
-        <p:style>
-          <a:lnRef idx="2">
-            <a:schemeClr val="accent1">
-              <a:shade val="50000"/>
-            </a:schemeClr>
-          </a:lnRef>
-          <a:fillRef idx="1">
-            <a:schemeClr val="accent1"/>
-          </a:fillRef>
-          <a:effectRef idx="0">
-            <a:schemeClr val="accent1"/>
-          </a:effectRef>
-          <a:fontRef idx="minor">
-            <a:schemeClr val="lt1"/>
-          </a:fontRef>
-        </p:style>
-        <p:txBody>
-          <a:bodyPr rtlCol="0" anchor="ctr"/>
-          <a:lstStyle/>
-          <a:p>
-            <a:pPr algn="ctr">
-              <a:defRPr/>
-            </a:pPr>
-            <a:endParaRPr lang="en-US" dirty="0">
-              <a:solidFill>
-                <a:srgbClr val="FFFFFF"/>
-              </a:solidFill>
-            </a:endParaRPr>
-          </a:p>
-        </p:txBody>
-      </p:sp>
-      <p:sp>
-        <p:nvSpPr>
-          <p:cNvPr id="79" name="ZoneTexte 194"/>
-          <p:cNvSpPr txBox="1"/>
-          <p:nvPr/>
-        </p:nvSpPr>
-        <p:spPr>
-          <a:xfrm rot="18945775">
-            <a:off x="1773967" y="3049033"/>
-            <a:ext cx="389850" cy="230832"/>
-          </a:xfrm>
-          <a:prstGeom prst="rect">
-            <a:avLst/>
-          </a:prstGeom>
-          <a:noFill/>
-        </p:spPr>
-        <p:txBody>
-          <a:bodyPr wrap="none" rtlCol="0">
-            <a:spAutoFit/>
-          </a:bodyPr>
-          <a:lstStyle/>
-          <a:p>
-            <a:pPr>
-              <a:defRPr/>
-            </a:pPr>
-            <a:r>
-              <a:rPr lang="en-US" sz="900" dirty="0" err="1">
-                <a:solidFill>
-                  <a:srgbClr val="FFFFFF"/>
-                </a:solidFill>
-              </a:rPr>
-              <a:t>conf</a:t>
-            </a:r>
-            <a:endParaRPr lang="en-US" sz="900" dirty="0">
-              <a:solidFill>
-                <a:srgbClr val="FFFFFF"/>
-              </a:solidFill>
-            </a:endParaRPr>
-          </a:p>
-        </p:txBody>
-      </p:sp>
-      <p:sp>
-        <p:nvSpPr>
-          <p:cNvPr id="87" name="Rectangle 86"/>
-          <p:cNvSpPr/>
-          <p:nvPr/>
-        </p:nvSpPr>
-        <p:spPr>
-          <a:xfrm>
-            <a:off x="1881115" y="3826764"/>
-            <a:ext cx="8640115" cy="430407"/>
-          </a:xfrm>
-          <a:prstGeom prst="rect">
-            <a:avLst/>
-          </a:prstGeom>
-          <a:solidFill>
-            <a:schemeClr val="tx1">
-              <a:lumMod val="75000"/>
-            </a:schemeClr>
-          </a:solidFill>
-          <a:ln>
-            <a:noFill/>
-          </a:ln>
-          <a:effectLst/>
-        </p:spPr>
-        <p:style>
-          <a:lnRef idx="2">
-            <a:schemeClr val="dk1">
-              <a:shade val="50000"/>
-            </a:schemeClr>
-          </a:lnRef>
-          <a:fillRef idx="1">
-            <a:schemeClr val="dk1"/>
-          </a:fillRef>
-          <a:effectRef idx="0">
-            <a:schemeClr val="dk1"/>
-          </a:effectRef>
-          <a:fontRef idx="minor">
-            <a:schemeClr val="lt1"/>
-          </a:fontRef>
-        </p:style>
-        <p:txBody>
-          <a:bodyPr rtlCol="0" anchor="ctr"/>
-          <a:lstStyle/>
-          <a:p>
-            <a:pPr algn="ctr">
-              <a:defRPr/>
-            </a:pPr>
-            <a:r>
-              <a:rPr lang="en-US" sz="1000" b="1" dirty="0">
-                <a:solidFill>
-                  <a:srgbClr val="FFFFFF"/>
-                </a:solidFill>
-                <a:cs typeface="Arial" panose="020B0604020202020204" pitchFamily="34" charset="0"/>
-              </a:rPr>
-              <a:t>MicroEJ SDK (Platform Builder)</a:t>
-            </a:r>
-          </a:p>
-        </p:txBody>
-      </p:sp>
-      <p:cxnSp>
-        <p:nvCxnSpPr>
-          <p:cNvPr id="88" name="Connecteur droit avec flèche 149"/>
-          <p:cNvCxnSpPr/>
-          <p:nvPr/>
-        </p:nvCxnSpPr>
-        <p:spPr>
-          <a:xfrm flipH="1">
-            <a:off x="3791744" y="2576094"/>
-            <a:ext cx="2765" cy="1250670"/>
-          </a:xfrm>
-          <a:prstGeom prst="straightConnector1">
-            <a:avLst/>
-          </a:prstGeom>
-          <a:ln>
-            <a:solidFill>
-              <a:schemeClr val="tx2"/>
-            </a:solidFill>
-            <a:tailEnd type="triangle"/>
-          </a:ln>
-        </p:spPr>
-        <p:style>
-          <a:lnRef idx="1">
-            <a:schemeClr val="accent1"/>
-          </a:lnRef>
-          <a:fillRef idx="0">
-            <a:schemeClr val="accent1"/>
-          </a:fillRef>
-          <a:effectRef idx="0">
-            <a:schemeClr val="accent1"/>
-          </a:effectRef>
-          <a:fontRef idx="minor">
-            <a:schemeClr val="tx1"/>
-          </a:fontRef>
-        </p:style>
-      </p:cxnSp>
-      <p:sp>
-        <p:nvSpPr>
-          <p:cNvPr id="89" name="ZoneTexte 175"/>
-          <p:cNvSpPr txBox="1"/>
-          <p:nvPr/>
-        </p:nvSpPr>
-        <p:spPr>
-          <a:xfrm>
-            <a:off x="3769313" y="3610518"/>
-            <a:ext cx="742511" cy="246221"/>
-          </a:xfrm>
-          <a:prstGeom prst="rect">
-            <a:avLst/>
-          </a:prstGeom>
-          <a:noFill/>
-        </p:spPr>
-        <p:txBody>
-          <a:bodyPr wrap="none" rtlCol="0">
-            <a:spAutoFit/>
-          </a:bodyPr>
-          <a:lstStyle/>
-          <a:p>
-            <a:pPr>
-              <a:defRPr/>
-            </a:pPr>
-            <a:r>
-              <a:rPr lang="en-US" sz="1000" dirty="0">
-                <a:solidFill>
-                  <a:srgbClr val="97A7AF"/>
-                </a:solidFill>
-              </a:rPr>
-              <a:t>(.a, .jar, .h)</a:t>
-            </a:r>
-          </a:p>
-        </p:txBody>
-      </p:sp>
-      <p:cxnSp>
-        <p:nvCxnSpPr>
-          <p:cNvPr id="91" name="Connecteur droit avec flèche 148"/>
-          <p:cNvCxnSpPr>
-            <a:stCxn id="77" idx="2"/>
-          </p:cNvCxnSpPr>
-          <p:nvPr/>
-        </p:nvCxnSpPr>
-        <p:spPr>
-          <a:xfrm>
-            <a:off x="2729993" y="3414895"/>
-            <a:ext cx="0" cy="411869"/>
-          </a:xfrm>
-          <a:prstGeom prst="straightConnector1">
-            <a:avLst/>
-          </a:prstGeom>
-          <a:ln>
-            <a:solidFill>
-              <a:schemeClr val="tx2"/>
-            </a:solidFill>
-            <a:tailEnd type="triangle"/>
-          </a:ln>
-        </p:spPr>
-        <p:style>
-          <a:lnRef idx="1">
-            <a:schemeClr val="accent1"/>
-          </a:lnRef>
-          <a:fillRef idx="0">
-            <a:schemeClr val="accent1"/>
-          </a:fillRef>
-          <a:effectRef idx="0">
-            <a:schemeClr val="accent1"/>
-          </a:effectRef>
-          <a:fontRef idx="minor">
-            <a:schemeClr val="tx1"/>
-          </a:fontRef>
-        </p:style>
-      </p:cxnSp>
-      <p:sp>
-        <p:nvSpPr>
-          <p:cNvPr id="92" name="ZoneTexte 176"/>
-          <p:cNvSpPr txBox="1"/>
-          <p:nvPr/>
-        </p:nvSpPr>
-        <p:spPr>
-          <a:xfrm>
-            <a:off x="1674033" y="3610518"/>
-            <a:ext cx="1109599" cy="246221"/>
-          </a:xfrm>
-          <a:prstGeom prst="rect">
-            <a:avLst/>
-          </a:prstGeom>
-          <a:noFill/>
-        </p:spPr>
-        <p:txBody>
-          <a:bodyPr wrap="none" rtlCol="0">
-            <a:spAutoFit/>
-          </a:bodyPr>
-          <a:lstStyle/>
-          <a:p>
-            <a:pPr>
-              <a:defRPr/>
-            </a:pPr>
-            <a:r>
-              <a:rPr lang="en-US" sz="1000" dirty="0">
-                <a:solidFill>
-                  <a:srgbClr val="97A7AF"/>
-                </a:solidFill>
-              </a:rPr>
-              <a:t>(.xml, .properties)</a:t>
-            </a:r>
-          </a:p>
-        </p:txBody>
-      </p:sp>
-      <p:sp>
-        <p:nvSpPr>
-          <p:cNvPr id="98" name="Rectangle 97"/>
-          <p:cNvSpPr/>
-          <p:nvPr/>
-        </p:nvSpPr>
-        <p:spPr>
-          <a:xfrm>
-            <a:off x="4075508" y="3054895"/>
-            <a:ext cx="2023200" cy="360000"/>
-          </a:xfrm>
-          <a:prstGeom prst="rect">
-            <a:avLst/>
-          </a:prstGeom>
-          <a:solidFill>
-            <a:schemeClr val="tx1">
-              <a:lumMod val="75000"/>
-            </a:schemeClr>
-          </a:solidFill>
-          <a:ln>
-            <a:noFill/>
-          </a:ln>
-          <a:effectLst/>
-        </p:spPr>
-        <p:style>
-          <a:lnRef idx="2">
-            <a:schemeClr val="dk1">
-              <a:shade val="50000"/>
-            </a:schemeClr>
-          </a:lnRef>
-          <a:fillRef idx="1">
-            <a:schemeClr val="dk1"/>
-          </a:fillRef>
-          <a:effectRef idx="0">
-            <a:schemeClr val="dk1"/>
-          </a:effectRef>
-          <a:fontRef idx="minor">
-            <a:schemeClr val="lt1"/>
-          </a:fontRef>
-        </p:style>
-        <p:txBody>
-          <a:bodyPr rtlCol="0" anchor="ctr"/>
-          <a:lstStyle/>
-          <a:p>
-            <a:pPr algn="ctr"/>
-            <a:r>
-              <a:rPr lang="en-US" sz="1000" b="1" dirty="0">
-                <a:solidFill>
-                  <a:srgbClr val="FFFFFF"/>
-                </a:solidFill>
-                <a:cs typeface="Arial" panose="020B0604020202020204" pitchFamily="34" charset="0"/>
-              </a:rPr>
-              <a:t>Java Compiler</a:t>
-            </a:r>
-          </a:p>
-        </p:txBody>
-      </p:sp>
-      <p:sp>
-        <p:nvSpPr>
-          <p:cNvPr id="99" name="Rectangle 98">
-            <a:extLst>
-              <a:ext uri="{FF2B5EF4-FFF2-40B4-BE49-F238E27FC236}">
-                <a16:creationId xmlns:a16="http://schemas.microsoft.com/office/drawing/2014/main" id="{AA17ECB5-EA6B-4CEB-A85B-DED237D057B2}"/>
-              </a:ext>
-            </a:extLst>
-          </p:cNvPr>
-          <p:cNvSpPr/>
-          <p:nvPr/>
-        </p:nvSpPr>
-        <p:spPr>
-          <a:xfrm>
-            <a:off x="6300000" y="3054895"/>
-            <a:ext cx="2023200" cy="360000"/>
-          </a:xfrm>
-          <a:prstGeom prst="rect">
-            <a:avLst/>
-          </a:prstGeom>
-          <a:solidFill>
-            <a:schemeClr val="tx1">
-              <a:lumMod val="75000"/>
-            </a:schemeClr>
-          </a:solidFill>
-          <a:ln>
-            <a:noFill/>
-          </a:ln>
-          <a:effectLst/>
-        </p:spPr>
-        <p:style>
-          <a:lnRef idx="2">
-            <a:schemeClr val="dk1">
-              <a:shade val="50000"/>
-            </a:schemeClr>
-          </a:lnRef>
-          <a:fillRef idx="1">
-            <a:schemeClr val="dk1"/>
-          </a:fillRef>
-          <a:effectRef idx="0">
-            <a:schemeClr val="dk1"/>
-          </a:effectRef>
-          <a:fontRef idx="minor">
-            <a:schemeClr val="lt1"/>
-          </a:fontRef>
-        </p:style>
-        <p:txBody>
-          <a:bodyPr rtlCol="0" anchor="ctr"/>
-          <a:lstStyle/>
-          <a:p>
-            <a:pPr algn="ctr"/>
-            <a:r>
-              <a:rPr lang="en-US" sz="1000" b="1" dirty="0">
-                <a:solidFill>
-                  <a:srgbClr val="FFFFFF"/>
-                </a:solidFill>
-                <a:cs typeface="Arial" panose="020B0604020202020204" pitchFamily="34" charset="0"/>
-              </a:rPr>
-              <a:t>Java/C Compiler</a:t>
-            </a:r>
-          </a:p>
-        </p:txBody>
-      </p:sp>
-      <p:sp>
-        <p:nvSpPr>
-          <p:cNvPr id="100" name="ZoneTexte 152"/>
-          <p:cNvSpPr txBox="1"/>
-          <p:nvPr/>
-        </p:nvSpPr>
-        <p:spPr>
-          <a:xfrm>
-            <a:off x="5106087" y="3618581"/>
-            <a:ext cx="428322" cy="246221"/>
-          </a:xfrm>
-          <a:prstGeom prst="rect">
-            <a:avLst/>
-          </a:prstGeom>
-          <a:noFill/>
-        </p:spPr>
-        <p:txBody>
-          <a:bodyPr wrap="none" rtlCol="0">
-            <a:spAutoFit/>
-          </a:bodyPr>
-          <a:lstStyle/>
-          <a:p>
-            <a:pPr>
-              <a:defRPr/>
-            </a:pPr>
-            <a:r>
-              <a:rPr lang="en-US" sz="1000" dirty="0">
-                <a:solidFill>
-                  <a:srgbClr val="97A7AF"/>
-                </a:solidFill>
-              </a:rPr>
-              <a:t>(.jar)</a:t>
-            </a:r>
-          </a:p>
-        </p:txBody>
-      </p:sp>
-      <p:sp>
-        <p:nvSpPr>
-          <p:cNvPr id="101" name="ZoneTexte 152"/>
-          <p:cNvSpPr txBox="1"/>
-          <p:nvPr/>
-        </p:nvSpPr>
-        <p:spPr>
-          <a:xfrm>
-            <a:off x="7320136" y="3610518"/>
-            <a:ext cx="702436" cy="246221"/>
-          </a:xfrm>
-          <a:prstGeom prst="rect">
-            <a:avLst/>
-          </a:prstGeom>
-          <a:noFill/>
-        </p:spPr>
-        <p:txBody>
-          <a:bodyPr wrap="none" rtlCol="0">
-            <a:spAutoFit/>
-          </a:bodyPr>
-          <a:lstStyle/>
-          <a:p>
-            <a:pPr>
-              <a:defRPr/>
-            </a:pPr>
-            <a:r>
-              <a:rPr lang="en-US" sz="1000" dirty="0">
-                <a:solidFill>
-                  <a:srgbClr val="97A7AF"/>
-                </a:solidFill>
-              </a:rPr>
-              <a:t>(.exe, .jar)</a:t>
-            </a:r>
-          </a:p>
-        </p:txBody>
-      </p:sp>
-      <p:cxnSp>
-        <p:nvCxnSpPr>
-          <p:cNvPr id="102" name="Connecteur droit avec flèche 148"/>
-          <p:cNvCxnSpPr>
-            <a:stCxn id="98" idx="2"/>
-          </p:cNvCxnSpPr>
-          <p:nvPr/>
-        </p:nvCxnSpPr>
-        <p:spPr>
-          <a:xfrm>
-            <a:off x="5087108" y="3414895"/>
-            <a:ext cx="0" cy="421138"/>
-          </a:xfrm>
-          <a:prstGeom prst="straightConnector1">
-            <a:avLst/>
-          </a:prstGeom>
-          <a:ln>
-            <a:solidFill>
-              <a:schemeClr val="tx2"/>
-            </a:solidFill>
-            <a:tailEnd type="triangle"/>
-          </a:ln>
-        </p:spPr>
-        <p:style>
-          <a:lnRef idx="1">
-            <a:schemeClr val="accent1"/>
-          </a:lnRef>
-          <a:fillRef idx="0">
-            <a:schemeClr val="accent1"/>
-          </a:fillRef>
-          <a:effectRef idx="0">
-            <a:schemeClr val="accent1"/>
-          </a:effectRef>
-          <a:fontRef idx="minor">
-            <a:schemeClr val="tx1"/>
-          </a:fontRef>
-        </p:style>
-      </p:cxnSp>
-      <p:cxnSp>
-        <p:nvCxnSpPr>
-          <p:cNvPr id="108" name="Connecteur droit avec flèche 148"/>
-          <p:cNvCxnSpPr/>
-          <p:nvPr/>
-        </p:nvCxnSpPr>
-        <p:spPr>
-          <a:xfrm>
-            <a:off x="7327016" y="3414895"/>
-            <a:ext cx="0" cy="411777"/>
-          </a:xfrm>
-          <a:prstGeom prst="straightConnector1">
-            <a:avLst/>
-          </a:prstGeom>
-          <a:ln>
-            <a:solidFill>
-              <a:schemeClr val="tx2"/>
-            </a:solidFill>
-            <a:tailEnd type="triangle"/>
-          </a:ln>
-        </p:spPr>
-        <p:style>
-          <a:lnRef idx="1">
-            <a:schemeClr val="accent1"/>
-          </a:lnRef>
-          <a:fillRef idx="0">
-            <a:schemeClr val="accent1"/>
-          </a:fillRef>
-          <a:effectRef idx="0">
-            <a:schemeClr val="accent1"/>
-          </a:effectRef>
-          <a:fontRef idx="minor">
-            <a:schemeClr val="tx1"/>
-          </a:fontRef>
-        </p:style>
-      </p:cxnSp>
-      <p:cxnSp>
-        <p:nvCxnSpPr>
-          <p:cNvPr id="112" name="Connecteur droit avec flèche 149"/>
-          <p:cNvCxnSpPr>
-            <a:stCxn id="65" idx="2"/>
-            <a:endCxn id="98" idx="0"/>
-          </p:cNvCxnSpPr>
-          <p:nvPr/>
-        </p:nvCxnSpPr>
-        <p:spPr>
-          <a:xfrm flipH="1">
-            <a:off x="5087108" y="2596556"/>
-            <a:ext cx="0" cy="458339"/>
-          </a:xfrm>
-          <a:prstGeom prst="straightConnector1">
-            <a:avLst/>
-          </a:prstGeom>
-          <a:ln>
-            <a:solidFill>
-              <a:schemeClr val="tx2"/>
-            </a:solidFill>
-            <a:tailEnd type="triangle"/>
-          </a:ln>
-        </p:spPr>
-        <p:style>
-          <a:lnRef idx="1">
-            <a:schemeClr val="accent1"/>
-          </a:lnRef>
-          <a:fillRef idx="0">
-            <a:schemeClr val="accent1"/>
-          </a:fillRef>
-          <a:effectRef idx="0">
-            <a:schemeClr val="accent1"/>
-          </a:effectRef>
-          <a:fontRef idx="minor">
-            <a:schemeClr val="tx1"/>
-          </a:fontRef>
-        </p:style>
-      </p:cxnSp>
-      <p:cxnSp>
-        <p:nvCxnSpPr>
-          <p:cNvPr id="114" name="Connecteur droit avec flèche 149"/>
-          <p:cNvCxnSpPr>
-            <a:stCxn id="70" idx="2"/>
-            <a:endCxn id="99" idx="0"/>
-          </p:cNvCxnSpPr>
-          <p:nvPr/>
-        </p:nvCxnSpPr>
-        <p:spPr>
-          <a:xfrm>
-            <a:off x="7303968" y="2591432"/>
-            <a:ext cx="7632" cy="463463"/>
-          </a:xfrm>
-          <a:prstGeom prst="straightConnector1">
-            <a:avLst/>
-          </a:prstGeom>
-          <a:ln>
-            <a:solidFill>
-              <a:schemeClr val="tx2"/>
-            </a:solidFill>
-            <a:tailEnd type="triangle"/>
-          </a:ln>
-        </p:spPr>
-        <p:style>
-          <a:lnRef idx="1">
-            <a:schemeClr val="accent1"/>
-          </a:lnRef>
-          <a:fillRef idx="0">
-            <a:schemeClr val="accent1"/>
-          </a:fillRef>
-          <a:effectRef idx="0">
-            <a:schemeClr val="accent1"/>
-          </a:effectRef>
-          <a:fontRef idx="minor">
-            <a:schemeClr val="tx1"/>
-          </a:fontRef>
-        </p:style>
-      </p:cxnSp>
-      <p:sp>
-        <p:nvSpPr>
-          <p:cNvPr id="117" name="ZoneTexte 173"/>
-          <p:cNvSpPr txBox="1"/>
-          <p:nvPr/>
-        </p:nvSpPr>
-        <p:spPr>
-          <a:xfrm>
-            <a:off x="5087108" y="2808674"/>
-            <a:ext cx="1680147" cy="246221"/>
-          </a:xfrm>
-          <a:prstGeom prst="rect">
-            <a:avLst/>
-          </a:prstGeom>
-          <a:noFill/>
-        </p:spPr>
-        <p:txBody>
-          <a:bodyPr wrap="square" rtlCol="0">
-            <a:spAutoFit/>
-          </a:bodyPr>
-          <a:lstStyle/>
-          <a:p>
-            <a:pPr>
-              <a:defRPr/>
-            </a:pPr>
-            <a:r>
-              <a:rPr lang="en-US" sz="1000" dirty="0">
-                <a:solidFill>
-                  <a:srgbClr val="97A7AF"/>
-                </a:solidFill>
-              </a:rPr>
-              <a:t>(.java, .list, resources)</a:t>
-            </a:r>
-          </a:p>
-        </p:txBody>
-      </p:sp>
-      <p:sp>
-        <p:nvSpPr>
-          <p:cNvPr id="118" name="ZoneTexte 173"/>
-          <p:cNvSpPr txBox="1"/>
-          <p:nvPr/>
-        </p:nvSpPr>
-        <p:spPr>
-          <a:xfrm>
-            <a:off x="7463222" y="2816485"/>
-            <a:ext cx="683825" cy="246221"/>
-          </a:xfrm>
-          <a:prstGeom prst="rect">
-            <a:avLst/>
-          </a:prstGeom>
-          <a:noFill/>
-        </p:spPr>
-        <p:txBody>
-          <a:bodyPr wrap="square" rtlCol="0">
-            <a:spAutoFit/>
-          </a:bodyPr>
-          <a:lstStyle/>
-          <a:p>
-            <a:pPr>
-              <a:defRPr/>
-            </a:pPr>
-            <a:r>
-              <a:rPr lang="en-US" sz="1000" dirty="0">
-                <a:solidFill>
-                  <a:srgbClr val="97A7AF"/>
-                </a:solidFill>
-              </a:rPr>
-              <a:t>(.java, .c)</a:t>
-            </a:r>
-          </a:p>
-        </p:txBody>
-      </p:sp>
-      <p:grpSp>
-        <p:nvGrpSpPr>
-          <p:cNvPr id="142" name="Group 141"/>
-          <p:cNvGrpSpPr/>
-          <p:nvPr/>
-        </p:nvGrpSpPr>
-        <p:grpSpPr>
-          <a:xfrm>
-            <a:off x="3528000" y="4663584"/>
-            <a:ext cx="5283610" cy="1481596"/>
-            <a:chOff x="3034800" y="4299128"/>
-            <a:chExt cx="5283610" cy="1481596"/>
-          </a:xfrm>
-        </p:grpSpPr>
         <p:sp>
           <p:nvSpPr>
-            <p:cNvPr id="126" name="Rectangle 125"/>
+            <p:cNvPr id="95" name="Rounded Rectangle 94"/>
             <p:cNvSpPr/>
             <p:nvPr/>
           </p:nvSpPr>
           <p:spPr>
             <a:xfrm>
-              <a:off x="3098873" y="4322534"/>
-              <a:ext cx="5219537" cy="1458190"/>
+              <a:off x="5065877" y="5008817"/>
+              <a:ext cx="1057233" cy="962893"/>
             </a:xfrm>
-            <a:prstGeom prst="rect">
-              <a:avLst/>
+            <a:prstGeom prst="roundRect">
+              <a:avLst>
+                <a:gd name="adj" fmla="val 7525"/>
+              </a:avLst>
             </a:prstGeom>
             <a:solidFill>
-              <a:schemeClr val="accent1"/>
+              <a:schemeClr val="accent4"/>
+            </a:solidFill>
+            <a:ln w="9525">
+              <a:solidFill>
+                <a:schemeClr val="bg1"/>
+              </a:solidFill>
+            </a:ln>
+            <a:effectLst/>
+          </p:spPr>
+          <p:style>
+            <a:lnRef idx="2">
+              <a:schemeClr val="dk1">
+                <a:shade val="50000"/>
+              </a:schemeClr>
+            </a:lnRef>
+            <a:fillRef idx="1">
+              <a:schemeClr val="dk1"/>
+            </a:fillRef>
+            <a:effectRef idx="0">
+              <a:schemeClr val="dk1"/>
+            </a:effectRef>
+            <a:fontRef idx="minor">
+              <a:schemeClr val="lt1"/>
+            </a:fontRef>
+          </p:style>
+          <p:txBody>
+            <a:bodyPr rtlCol="0" anchor="ctr"/>
+            <a:lstStyle/>
+            <a:p>
+              <a:pPr algn="ctr">
+                <a:defRPr/>
+              </a:pPr>
+              <a:r>
+                <a:rPr lang="en-US" sz="1000" dirty="0">
+                  <a:solidFill>
+                    <a:srgbClr val="FFFFFF"/>
+                  </a:solidFill>
+                  <a:latin typeface="Source Sans Pro Light" charset="0"/>
+                  <a:ea typeface="Source Sans Pro Light" charset="0"/>
+                  <a:cs typeface="Source Sans Pro Light" charset="0"/>
+                </a:rPr>
+                <a:t>Java Foundation Libraries</a:t>
+              </a:r>
+            </a:p>
+          </p:txBody>
+        </p:sp>
+        <p:sp>
+          <p:nvSpPr>
+            <p:cNvPr id="97" name="Rounded Rectangle 96"/>
+            <p:cNvSpPr/>
+            <p:nvPr/>
+          </p:nvSpPr>
+          <p:spPr>
+            <a:xfrm>
+              <a:off x="7618430" y="5008817"/>
+              <a:ext cx="1057233" cy="962893"/>
+            </a:xfrm>
+            <a:prstGeom prst="roundRect">
+              <a:avLst>
+                <a:gd name="adj" fmla="val 7525"/>
+              </a:avLst>
+            </a:prstGeom>
+            <a:solidFill>
+              <a:schemeClr val="tx2"/>
+            </a:solidFill>
+            <a:ln w="9525">
+              <a:solidFill>
+                <a:schemeClr val="bg1"/>
+              </a:solidFill>
+            </a:ln>
+            <a:effectLst/>
+          </p:spPr>
+          <p:style>
+            <a:lnRef idx="2">
+              <a:schemeClr val="dk1">
+                <a:shade val="50000"/>
+              </a:schemeClr>
+            </a:lnRef>
+            <a:fillRef idx="1">
+              <a:schemeClr val="dk1"/>
+            </a:fillRef>
+            <a:effectRef idx="0">
+              <a:schemeClr val="dk1"/>
+            </a:effectRef>
+            <a:fontRef idx="minor">
+              <a:schemeClr val="lt1"/>
+            </a:fontRef>
+          </p:style>
+          <p:txBody>
+            <a:bodyPr rtlCol="0" anchor="ctr"/>
+            <a:lstStyle/>
+            <a:p>
+              <a:pPr algn="ctr">
+                <a:defRPr/>
+              </a:pPr>
+              <a:r>
+                <a:rPr lang="en-US" sz="1000" dirty="0">
+                  <a:solidFill>
+                    <a:srgbClr val="FFFFFF"/>
+                  </a:solidFill>
+                  <a:latin typeface="Source Sans Pro Light" charset="0"/>
+                  <a:ea typeface="Source Sans Pro Light" charset="0"/>
+                  <a:cs typeface="Source Sans Pro Light" charset="0"/>
+                </a:rPr>
+                <a:t>Scripts </a:t>
+              </a:r>
+              <a:r>
+                <a:rPr lang="en-US" sz="1000" dirty="0" smtClean="0">
+                  <a:solidFill>
+                    <a:srgbClr val="FFFFFF"/>
+                  </a:solidFill>
+                  <a:latin typeface="Source Sans Pro Light" charset="0"/>
+                  <a:ea typeface="Source Sans Pro Light" charset="0"/>
+                  <a:cs typeface="Source Sans Pro Light" charset="0"/>
+                </a:rPr>
+                <a:t>+ </a:t>
+              </a:r>
+              <a:r>
+                <a:rPr lang="en-US" sz="1000" dirty="0">
+                  <a:solidFill>
+                    <a:srgbClr val="FFFFFF"/>
+                  </a:solidFill>
+                  <a:latin typeface="Source Sans Pro Light" charset="0"/>
+                  <a:ea typeface="Source Sans Pro Light" charset="0"/>
+                  <a:cs typeface="Source Sans Pro Light" charset="0"/>
+                </a:rPr>
+                <a:t>Tooling </a:t>
+              </a:r>
+              <a:r>
+                <a:rPr lang="en-US" sz="1000" dirty="0" smtClean="0">
+                  <a:solidFill>
+                    <a:srgbClr val="FFFFFF"/>
+                  </a:solidFill>
+                  <a:latin typeface="Source Sans Pro Light" charset="0"/>
+                  <a:ea typeface="Source Sans Pro Light" charset="0"/>
+                  <a:cs typeface="Source Sans Pro Light" charset="0"/>
+                </a:rPr>
+                <a:t>+ </a:t>
+              </a:r>
+              <a:r>
+                <a:rPr lang="en-US" sz="1000" dirty="0">
+                  <a:solidFill>
+                    <a:srgbClr val="FFFFFF"/>
+                  </a:solidFill>
+                  <a:latin typeface="Source Sans Pro Light" charset="0"/>
+                  <a:ea typeface="Source Sans Pro Light" charset="0"/>
+                  <a:cs typeface="Source Sans Pro Light" charset="0"/>
+                </a:rPr>
+                <a:t>Documentation</a:t>
+              </a:r>
+            </a:p>
+          </p:txBody>
+        </p:sp>
+        <p:sp>
+          <p:nvSpPr>
+            <p:cNvPr id="93" name="Rounded Rectangle 92"/>
+            <p:cNvSpPr/>
+            <p:nvPr/>
+          </p:nvSpPr>
+          <p:spPr>
+            <a:xfrm>
+              <a:off x="3788227" y="5008817"/>
+              <a:ext cx="1057233" cy="962893"/>
+            </a:xfrm>
+            <a:prstGeom prst="roundRect">
+              <a:avLst>
+                <a:gd name="adj" fmla="val 7525"/>
+              </a:avLst>
+            </a:prstGeom>
+            <a:solidFill>
+              <a:schemeClr val="bg1"/>
             </a:solidFill>
             <a:ln>
               <a:noFill/>
@@ -34270,35 +33350,580 @@
             </a:fontRef>
           </p:style>
           <p:txBody>
-            <a:bodyPr rtlCol="0" anchor="t"/>
+            <a:bodyPr rtlCol="0" anchor="ctr"/>
+            <a:lstStyle/>
+            <a:p>
+              <a:pPr algn="ctr">
+                <a:defRPr/>
+              </a:pPr>
+              <a:endParaRPr lang="en-US" sz="1000" dirty="0">
+                <a:solidFill>
+                  <a:srgbClr val="FFFFFF"/>
+                </a:solidFill>
+                <a:latin typeface="Source Sans Pro Light" charset="0"/>
+                <a:ea typeface="Source Sans Pro Light" charset="0"/>
+                <a:cs typeface="Source Sans Pro Light" charset="0"/>
+              </a:endParaRPr>
+            </a:p>
+          </p:txBody>
+        </p:sp>
+        <p:sp>
+          <p:nvSpPr>
+            <p:cNvPr id="11" name="Rounded Rectangle 10"/>
+            <p:cNvSpPr/>
+            <p:nvPr/>
+          </p:nvSpPr>
+          <p:spPr>
+            <a:xfrm>
+              <a:off x="1893693" y="3048882"/>
+              <a:ext cx="1741313" cy="385889"/>
+            </a:xfrm>
+            <a:prstGeom prst="roundRect">
+              <a:avLst/>
+            </a:prstGeom>
+            <a:solidFill>
+              <a:schemeClr val="tx2"/>
+            </a:solidFill>
+            <a:ln>
+              <a:noFill/>
+            </a:ln>
+            <a:effectLst/>
+          </p:spPr>
+          <p:style>
+            <a:lnRef idx="2">
+              <a:schemeClr val="dk1">
+                <a:shade val="50000"/>
+              </a:schemeClr>
+            </a:lnRef>
+            <a:fillRef idx="1">
+              <a:schemeClr val="dk1"/>
+            </a:fillRef>
+            <a:effectRef idx="0">
+              <a:schemeClr val="dk1"/>
+            </a:effectRef>
+            <a:fontRef idx="minor">
+              <a:schemeClr val="lt1"/>
+            </a:fontRef>
+          </p:style>
+          <p:txBody>
+            <a:bodyPr rtlCol="0" anchor="ctr"/>
             <a:lstStyle/>
             <a:p>
               <a:pPr algn="ctr">
                 <a:defRPr/>
               </a:pPr>
               <a:r>
-                <a:rPr lang="en-US" sz="1000" b="1" dirty="0">
+                <a:rPr lang="en-US" sz="1000" dirty="0">
                   <a:solidFill>
                     <a:srgbClr val="FFFFFF"/>
                   </a:solidFill>
-                  <a:cs typeface="Arial" panose="020B0604020202020204" pitchFamily="34" charset="0"/>
+                  <a:latin typeface="Source Sans Pro Light" charset="0"/>
+                  <a:ea typeface="Source Sans Pro Light" charset="0"/>
+                  <a:cs typeface="Source Sans Pro Light" charset="0"/>
                 </a:rPr>
-                <a:t>MicroEJ Platform</a:t>
+                <a:t>Platform  Configuration</a:t>
               </a:r>
             </a:p>
           </p:txBody>
         </p:sp>
         <p:grpSp>
           <p:nvGrpSpPr>
-            <p:cNvPr id="127" name="Group 126"/>
+            <p:cNvPr id="12" name="Group 11"/>
             <p:cNvGrpSpPr/>
             <p:nvPr/>
           </p:nvGrpSpPr>
           <p:grpSpPr>
             <a:xfrm>
-              <a:off x="3034800" y="4299128"/>
+              <a:off x="1781280" y="3045863"/>
+              <a:ext cx="393284" cy="286664"/>
+              <a:chOff x="1773967" y="3049033"/>
+              <a:chExt cx="393284" cy="286664"/>
+            </a:xfrm>
+          </p:grpSpPr>
+          <p:sp>
+            <p:nvSpPr>
+              <p:cNvPr id="78" name="Bande diagonale 193"/>
+              <p:cNvSpPr/>
+              <p:nvPr/>
+            </p:nvSpPr>
+            <p:spPr>
+              <a:xfrm>
+                <a:off x="1887423" y="3055869"/>
+                <a:ext cx="279828" cy="279828"/>
+              </a:xfrm>
+              <a:prstGeom prst="diagStripe">
+                <a:avLst>
+                  <a:gd name="adj" fmla="val 41991"/>
+                </a:avLst>
+              </a:prstGeom>
+              <a:solidFill>
+                <a:schemeClr val="tx1">
+                  <a:lumMod val="75000"/>
+                </a:schemeClr>
+              </a:solidFill>
+              <a:ln>
+                <a:noFill/>
+              </a:ln>
+            </p:spPr>
+            <p:style>
+              <a:lnRef idx="2">
+                <a:schemeClr val="accent1">
+                  <a:shade val="50000"/>
+                </a:schemeClr>
+              </a:lnRef>
+              <a:fillRef idx="1">
+                <a:schemeClr val="accent1"/>
+              </a:fillRef>
+              <a:effectRef idx="0">
+                <a:schemeClr val="accent1"/>
+              </a:effectRef>
+              <a:fontRef idx="minor">
+                <a:schemeClr val="lt1"/>
+              </a:fontRef>
+            </p:style>
+            <p:txBody>
+              <a:bodyPr rtlCol="0" anchor="ctr"/>
+              <a:lstStyle/>
+              <a:p>
+                <a:pPr algn="ctr">
+                  <a:defRPr/>
+                </a:pPr>
+                <a:endParaRPr lang="en-US" dirty="0">
+                  <a:solidFill>
+                    <a:srgbClr val="FFFFFF"/>
+                  </a:solidFill>
+                </a:endParaRPr>
+              </a:p>
+            </p:txBody>
+          </p:sp>
+          <p:sp>
+            <p:nvSpPr>
+              <p:cNvPr id="79" name="ZoneTexte 194"/>
+              <p:cNvSpPr txBox="1"/>
+              <p:nvPr/>
+            </p:nvSpPr>
+            <p:spPr>
+              <a:xfrm rot="18945775">
+                <a:off x="1773967" y="3049033"/>
+                <a:ext cx="389850" cy="230832"/>
+              </a:xfrm>
+              <a:prstGeom prst="rect">
+                <a:avLst/>
+              </a:prstGeom>
+              <a:noFill/>
+            </p:spPr>
+            <p:txBody>
+              <a:bodyPr wrap="none" rtlCol="0">
+                <a:spAutoFit/>
+              </a:bodyPr>
+              <a:lstStyle/>
+              <a:p>
+                <a:pPr>
+                  <a:defRPr/>
+                </a:pPr>
+                <a:r>
+                  <a:rPr lang="en-US" sz="900" dirty="0" err="1">
+                    <a:solidFill>
+                      <a:srgbClr val="FFFFFF"/>
+                    </a:solidFill>
+                  </a:rPr>
+                  <a:t>conf</a:t>
+                </a:r>
+                <a:endParaRPr lang="en-US" sz="900" dirty="0">
+                  <a:solidFill>
+                    <a:srgbClr val="FFFFFF"/>
+                  </a:solidFill>
+                </a:endParaRPr>
+              </a:p>
+            </p:txBody>
+          </p:sp>
+        </p:grpSp>
+        <p:cxnSp>
+          <p:nvCxnSpPr>
+            <p:cNvPr id="88" name="Connecteur droit avec flèche 149"/>
+            <p:cNvCxnSpPr/>
+            <p:nvPr/>
+          </p:nvCxnSpPr>
+          <p:spPr>
+            <a:xfrm flipH="1">
+              <a:off x="3791744" y="2576094"/>
+              <a:ext cx="2765" cy="1250670"/>
+            </a:xfrm>
+            <a:prstGeom prst="straightConnector1">
+              <a:avLst/>
+            </a:prstGeom>
+            <a:ln>
+              <a:solidFill>
+                <a:schemeClr val="tx2"/>
+              </a:solidFill>
+              <a:tailEnd type="triangle"/>
+            </a:ln>
+          </p:spPr>
+          <p:style>
+            <a:lnRef idx="1">
+              <a:schemeClr val="accent1"/>
+            </a:lnRef>
+            <a:fillRef idx="0">
+              <a:schemeClr val="accent1"/>
+            </a:fillRef>
+            <a:effectRef idx="0">
+              <a:schemeClr val="accent1"/>
+            </a:effectRef>
+            <a:fontRef idx="minor">
+              <a:schemeClr val="tx1"/>
+            </a:fontRef>
+          </p:style>
+        </p:cxnSp>
+        <p:sp>
+          <p:nvSpPr>
+            <p:cNvPr id="89" name="ZoneTexte 175"/>
+            <p:cNvSpPr txBox="1"/>
+            <p:nvPr/>
+          </p:nvSpPr>
+          <p:spPr>
+            <a:xfrm>
+              <a:off x="3769313" y="3610518"/>
+              <a:ext cx="742511" cy="246221"/>
+            </a:xfrm>
+            <a:prstGeom prst="rect">
+              <a:avLst/>
+            </a:prstGeom>
+            <a:noFill/>
+          </p:spPr>
+          <p:txBody>
+            <a:bodyPr wrap="none" rtlCol="0">
+              <a:spAutoFit/>
+            </a:bodyPr>
+            <a:lstStyle/>
+            <a:p>
+              <a:pPr>
+                <a:defRPr/>
+              </a:pPr>
+              <a:r>
+                <a:rPr lang="en-US" sz="1000" dirty="0">
+                  <a:solidFill>
+                    <a:srgbClr val="97A7AF"/>
+                  </a:solidFill>
+                </a:rPr>
+                <a:t>(.a, .jar, .h)</a:t>
+              </a:r>
+            </a:p>
+          </p:txBody>
+        </p:sp>
+        <p:cxnSp>
+          <p:nvCxnSpPr>
+            <p:cNvPr id="91" name="Connecteur droit avec flèche 148"/>
+            <p:cNvCxnSpPr/>
+            <p:nvPr/>
+          </p:nvCxnSpPr>
+          <p:spPr>
+            <a:xfrm>
+              <a:off x="2440108" y="3501008"/>
+              <a:ext cx="0" cy="333328"/>
+            </a:xfrm>
+            <a:prstGeom prst="straightConnector1">
+              <a:avLst/>
+            </a:prstGeom>
+            <a:ln>
+              <a:solidFill>
+                <a:schemeClr val="tx2"/>
+              </a:solidFill>
+              <a:tailEnd type="triangle"/>
+            </a:ln>
+          </p:spPr>
+          <p:style>
+            <a:lnRef idx="1">
+              <a:schemeClr val="accent1"/>
+            </a:lnRef>
+            <a:fillRef idx="0">
+              <a:schemeClr val="accent1"/>
+            </a:fillRef>
+            <a:effectRef idx="0">
+              <a:schemeClr val="accent1"/>
+            </a:effectRef>
+            <a:fontRef idx="minor">
+              <a:schemeClr val="tx1"/>
+            </a:fontRef>
+          </p:style>
+        </p:cxnSp>
+        <p:sp>
+          <p:nvSpPr>
+            <p:cNvPr id="92" name="ZoneTexte 176"/>
+            <p:cNvSpPr txBox="1"/>
+            <p:nvPr/>
+          </p:nvSpPr>
+          <p:spPr>
+            <a:xfrm>
+              <a:off x="2440108" y="3620984"/>
+              <a:ext cx="1109599" cy="246221"/>
+            </a:xfrm>
+            <a:prstGeom prst="rect">
+              <a:avLst/>
+            </a:prstGeom>
+            <a:noFill/>
+          </p:spPr>
+          <p:txBody>
+            <a:bodyPr wrap="none" rtlCol="0">
+              <a:spAutoFit/>
+            </a:bodyPr>
+            <a:lstStyle/>
+            <a:p>
+              <a:pPr>
+                <a:defRPr/>
+              </a:pPr>
+              <a:r>
+                <a:rPr lang="en-US" sz="1000" dirty="0">
+                  <a:solidFill>
+                    <a:srgbClr val="97A7AF"/>
+                  </a:solidFill>
+                </a:rPr>
+                <a:t>(.xml, .properties)</a:t>
+              </a:r>
+            </a:p>
+          </p:txBody>
+        </p:sp>
+        <p:grpSp>
+          <p:nvGrpSpPr>
+            <p:cNvPr id="16" name="Group 15"/>
+            <p:cNvGrpSpPr/>
+            <p:nvPr/>
+          </p:nvGrpSpPr>
+          <p:grpSpPr>
+            <a:xfrm>
+              <a:off x="5087108" y="3501008"/>
+              <a:ext cx="2239908" cy="341721"/>
+              <a:chOff x="5087108" y="3501008"/>
+              <a:chExt cx="2239908" cy="421138"/>
+            </a:xfrm>
+          </p:grpSpPr>
+          <p:cxnSp>
+            <p:nvCxnSpPr>
+              <p:cNvPr id="102" name="Connecteur droit avec flèche 148"/>
+              <p:cNvCxnSpPr/>
+              <p:nvPr/>
+            </p:nvCxnSpPr>
+            <p:spPr>
+              <a:xfrm>
+                <a:off x="5087108" y="3501008"/>
+                <a:ext cx="0" cy="421138"/>
+              </a:xfrm>
+              <a:prstGeom prst="straightConnector1">
+                <a:avLst/>
+              </a:prstGeom>
+              <a:ln>
+                <a:solidFill>
+                  <a:schemeClr val="tx2"/>
+                </a:solidFill>
+                <a:tailEnd type="triangle"/>
+              </a:ln>
+            </p:spPr>
+            <p:style>
+              <a:lnRef idx="1">
+                <a:schemeClr val="accent1"/>
+              </a:lnRef>
+              <a:fillRef idx="0">
+                <a:schemeClr val="accent1"/>
+              </a:fillRef>
+              <a:effectRef idx="0">
+                <a:schemeClr val="accent1"/>
+              </a:effectRef>
+              <a:fontRef idx="minor">
+                <a:schemeClr val="tx1"/>
+              </a:fontRef>
+            </p:style>
+          </p:cxnSp>
+          <p:cxnSp>
+            <p:nvCxnSpPr>
+              <p:cNvPr id="108" name="Connecteur droit avec flèche 148"/>
+              <p:cNvCxnSpPr/>
+              <p:nvPr/>
+            </p:nvCxnSpPr>
+            <p:spPr>
+              <a:xfrm>
+                <a:off x="7327016" y="3501008"/>
+                <a:ext cx="0" cy="411777"/>
+              </a:xfrm>
+              <a:prstGeom prst="straightConnector1">
+                <a:avLst/>
+              </a:prstGeom>
+              <a:ln>
+                <a:solidFill>
+                  <a:schemeClr val="tx2"/>
+                </a:solidFill>
+                <a:tailEnd type="triangle"/>
+              </a:ln>
+            </p:spPr>
+            <p:style>
+              <a:lnRef idx="1">
+                <a:schemeClr val="accent1"/>
+              </a:lnRef>
+              <a:fillRef idx="0">
+                <a:schemeClr val="accent1"/>
+              </a:fillRef>
+              <a:effectRef idx="0">
+                <a:schemeClr val="accent1"/>
+              </a:effectRef>
+              <a:fontRef idx="minor">
+                <a:schemeClr val="tx1"/>
+              </a:fontRef>
+            </p:style>
+          </p:cxnSp>
+        </p:grpSp>
+        <p:cxnSp>
+          <p:nvCxnSpPr>
+            <p:cNvPr id="112" name="Connecteur droit avec flèche 149"/>
+            <p:cNvCxnSpPr/>
+            <p:nvPr/>
+          </p:nvCxnSpPr>
+          <p:spPr>
+            <a:xfrm flipH="1">
+              <a:off x="5087108" y="2559469"/>
+              <a:ext cx="0" cy="458339"/>
+            </a:xfrm>
+            <a:prstGeom prst="straightConnector1">
+              <a:avLst/>
+            </a:prstGeom>
+            <a:ln>
+              <a:solidFill>
+                <a:schemeClr val="tx2"/>
+              </a:solidFill>
+              <a:tailEnd type="triangle"/>
+            </a:ln>
+          </p:spPr>
+          <p:style>
+            <a:lnRef idx="1">
+              <a:schemeClr val="accent1"/>
+            </a:lnRef>
+            <a:fillRef idx="0">
+              <a:schemeClr val="accent1"/>
+            </a:fillRef>
+            <a:effectRef idx="0">
+              <a:schemeClr val="accent1"/>
+            </a:effectRef>
+            <a:fontRef idx="minor">
+              <a:schemeClr val="tx1"/>
+            </a:fontRef>
+          </p:style>
+        </p:cxnSp>
+        <p:cxnSp>
+          <p:nvCxnSpPr>
+            <p:cNvPr id="114" name="Connecteur droit avec flèche 149"/>
+            <p:cNvCxnSpPr/>
+            <p:nvPr/>
+          </p:nvCxnSpPr>
+          <p:spPr>
+            <a:xfrm>
+              <a:off x="7303968" y="2554345"/>
+              <a:ext cx="7632" cy="463463"/>
+            </a:xfrm>
+            <a:prstGeom prst="straightConnector1">
+              <a:avLst/>
+            </a:prstGeom>
+            <a:ln>
+              <a:solidFill>
+                <a:schemeClr val="tx2"/>
+              </a:solidFill>
+              <a:tailEnd type="triangle"/>
+            </a:ln>
+          </p:spPr>
+          <p:style>
+            <a:lnRef idx="1">
+              <a:schemeClr val="accent1"/>
+            </a:lnRef>
+            <a:fillRef idx="0">
+              <a:schemeClr val="accent1"/>
+            </a:fillRef>
+            <a:effectRef idx="0">
+              <a:schemeClr val="accent1"/>
+            </a:effectRef>
+            <a:fontRef idx="minor">
+              <a:schemeClr val="tx1"/>
+            </a:fontRef>
+          </p:style>
+        </p:cxnSp>
+        <p:sp>
+          <p:nvSpPr>
+            <p:cNvPr id="117" name="ZoneTexte 173"/>
+            <p:cNvSpPr txBox="1"/>
+            <p:nvPr/>
+          </p:nvSpPr>
+          <p:spPr>
+            <a:xfrm>
+              <a:off x="5087108" y="2771587"/>
+              <a:ext cx="1680147" cy="246221"/>
+            </a:xfrm>
+            <a:prstGeom prst="rect">
+              <a:avLst/>
+            </a:prstGeom>
+            <a:noFill/>
+          </p:spPr>
+          <p:txBody>
+            <a:bodyPr wrap="square" rtlCol="0">
+              <a:spAutoFit/>
+            </a:bodyPr>
+            <a:lstStyle/>
+            <a:p>
+              <a:pPr>
+                <a:defRPr/>
+              </a:pPr>
+              <a:r>
+                <a:rPr lang="en-US" sz="1000" dirty="0">
+                  <a:solidFill>
+                    <a:srgbClr val="97A7AF"/>
+                  </a:solidFill>
+                </a:rPr>
+                <a:t>(.java, .list, resources)</a:t>
+              </a:r>
+            </a:p>
+          </p:txBody>
+        </p:sp>
+        <p:sp>
+          <p:nvSpPr>
+            <p:cNvPr id="118" name="ZoneTexte 173"/>
+            <p:cNvSpPr txBox="1"/>
+            <p:nvPr/>
+          </p:nvSpPr>
+          <p:spPr>
+            <a:xfrm>
+              <a:off x="7327016" y="2779398"/>
+              <a:ext cx="683825" cy="246221"/>
+            </a:xfrm>
+            <a:prstGeom prst="rect">
+              <a:avLst/>
+            </a:prstGeom>
+            <a:noFill/>
+          </p:spPr>
+          <p:txBody>
+            <a:bodyPr wrap="square" rtlCol="0">
+              <a:spAutoFit/>
+            </a:bodyPr>
+            <a:lstStyle/>
+            <a:p>
+              <a:pPr>
+                <a:defRPr/>
+              </a:pPr>
+              <a:r>
+                <a:rPr lang="en-US" sz="1000" dirty="0">
+                  <a:solidFill>
+                    <a:srgbClr val="97A7AF"/>
+                  </a:solidFill>
+                </a:rPr>
+                <a:t>(.java, .c)</a:t>
+              </a:r>
+            </a:p>
+          </p:txBody>
+        </p:sp>
+        <p:grpSp>
+          <p:nvGrpSpPr>
+            <p:cNvPr id="19" name="Group 18"/>
+            <p:cNvGrpSpPr/>
+            <p:nvPr/>
+          </p:nvGrpSpPr>
+          <p:grpSpPr>
+            <a:xfrm>
+              <a:off x="3528000" y="4676406"/>
               <a:ext cx="344751" cy="303135"/>
-              <a:chOff x="2671961" y="3299648"/>
+              <a:chOff x="3528000" y="4663584"/>
               <a:chExt cx="344751" cy="303135"/>
             </a:xfrm>
           </p:grpSpPr>
@@ -34310,7 +33935,7 @@
             </p:nvSpPr>
             <p:spPr>
               <a:xfrm>
-                <a:off x="2736884" y="3322955"/>
+                <a:off x="3592923" y="4686891"/>
                 <a:ext cx="279828" cy="279828"/>
               </a:xfrm>
               <a:prstGeom prst="diagStripe">
@@ -34354,6 +33979,9 @@
                   <a:solidFill>
                     <a:srgbClr val="FFFFFF"/>
                   </a:solidFill>
+                  <a:latin typeface="Source Sans Pro Light" charset="0"/>
+                  <a:ea typeface="Source Sans Pro Light" charset="0"/>
+                  <a:cs typeface="Source Sans Pro Light" charset="0"/>
                 </a:endParaRPr>
               </a:p>
             </p:txBody>
@@ -34366,7 +33994,7 @@
             </p:nvSpPr>
             <p:spPr>
               <a:xfrm rot="18945775">
-                <a:off x="2671961" y="3299648"/>
+                <a:off x="3528000" y="4663584"/>
                 <a:ext cx="333746" cy="230832"/>
               </a:xfrm>
               <a:prstGeom prst="rect">
@@ -34388,6 +34016,9 @@
                     <a:solidFill>
                       <a:srgbClr val="FFFFFF"/>
                     </a:solidFill>
+                    <a:latin typeface="Source Sans Pro Light" charset="0"/>
+                    <a:ea typeface="Source Sans Pro Light" charset="0"/>
+                    <a:cs typeface="Source Sans Pro Light" charset="0"/>
                   </a:rPr>
                   <a:t>bin</a:t>
                 </a:r>
@@ -34395,205 +34026,222 @@
             </p:txBody>
           </p:sp>
         </p:grpSp>
-        <p:grpSp>
-          <p:nvGrpSpPr>
-            <p:cNvPr id="128" name="Group 127"/>
-            <p:cNvGrpSpPr/>
-            <p:nvPr/>
-          </p:nvGrpSpPr>
-          <p:grpSpPr>
-            <a:xfrm>
-              <a:off x="3273048" y="4633391"/>
-              <a:ext cx="1084312" cy="986864"/>
-              <a:chOff x="535360" y="4765860"/>
-              <a:chExt cx="1084312" cy="986864"/>
-            </a:xfrm>
-          </p:grpSpPr>
-          <p:sp>
-            <p:nvSpPr>
-              <p:cNvPr id="132" name="Rectangle 131"/>
-              <p:cNvSpPr/>
-              <p:nvPr/>
-            </p:nvSpPr>
-            <p:spPr>
-              <a:xfrm>
-                <a:off x="535360" y="4765860"/>
-                <a:ext cx="1084312" cy="986864"/>
-              </a:xfrm>
-              <a:prstGeom prst="rect">
-                <a:avLst/>
-              </a:prstGeom>
-              <a:solidFill>
-                <a:schemeClr val="accent1"/>
-              </a:solidFill>
-              <a:ln>
-                <a:solidFill>
-                  <a:schemeClr val="bg1"/>
-                </a:solidFill>
-              </a:ln>
-              <a:effectLst/>
-            </p:spPr>
-            <p:style>
-              <a:lnRef idx="2">
-                <a:schemeClr val="dk1">
-                  <a:shade val="50000"/>
-                </a:schemeClr>
-              </a:lnRef>
-              <a:fillRef idx="1">
-                <a:schemeClr val="dk1"/>
-              </a:fillRef>
-              <a:effectRef idx="0">
-                <a:schemeClr val="dk1"/>
-              </a:effectRef>
-              <a:fontRef idx="minor">
-                <a:schemeClr val="lt1"/>
-              </a:fontRef>
-            </p:style>
-            <p:txBody>
-              <a:bodyPr rtlCol="0" anchor="t"/>
-              <a:lstStyle/>
-              <a:p>
-                <a:pPr algn="ctr">
-                  <a:defRPr/>
-                </a:pPr>
-                <a:r>
-                  <a:rPr lang="en-US" sz="1000" b="1" dirty="0">
-                    <a:solidFill>
-                      <a:srgbClr val="FFFFFF"/>
-                    </a:solidFill>
-                    <a:cs typeface="Arial" panose="020B0604020202020204" pitchFamily="34" charset="0"/>
-                  </a:rPr>
-                  <a:t>MEJ32 Core</a:t>
-                </a:r>
-              </a:p>
-            </p:txBody>
-          </p:sp>
-          <p:grpSp>
-            <p:nvGrpSpPr>
-              <p:cNvPr id="133" name="Group 132">
-                <a:extLst>
-                  <a:ext uri="{FF2B5EF4-FFF2-40B4-BE49-F238E27FC236}">
-                    <a16:creationId xmlns:a16="http://schemas.microsoft.com/office/drawing/2014/main" id="{B912B7B2-7600-4C37-9CFB-97257AC4EC6F}"/>
-                  </a:ext>
-                </a:extLst>
-              </p:cNvPr>
-              <p:cNvGrpSpPr/>
-              <p:nvPr/>
-            </p:nvGrpSpPr>
-            <p:grpSpPr>
-              <a:xfrm>
-                <a:off x="750869" y="4987875"/>
-                <a:ext cx="643435" cy="643435"/>
-                <a:chOff x="1326080" y="2569883"/>
-                <a:chExt cx="900000" cy="900000"/>
-              </a:xfrm>
-            </p:grpSpPr>
-            <p:sp>
-              <p:nvSpPr>
-                <p:cNvPr id="134" name="Ellipse 60">
-                  <a:extLst>
-                    <a:ext uri="{FF2B5EF4-FFF2-40B4-BE49-F238E27FC236}">
-                      <a16:creationId xmlns:a16="http://schemas.microsoft.com/office/drawing/2014/main" id="{D589262F-3DC8-48B1-AC21-267EC2396FD0}"/>
-                    </a:ext>
-                  </a:extLst>
-                </p:cNvPr>
-                <p:cNvSpPr>
-                  <a:spLocks/>
-                </p:cNvSpPr>
-                <p:nvPr/>
-              </p:nvSpPr>
-              <p:spPr>
-                <a:xfrm>
-                  <a:off x="1326080" y="2569883"/>
-                  <a:ext cx="900000" cy="900000"/>
-                </a:xfrm>
-                <a:prstGeom prst="ellipse">
-                  <a:avLst/>
-                </a:prstGeom>
-                <a:solidFill>
-                  <a:srgbClr val="FFFFFF"/>
-                </a:solidFill>
-                <a:ln w="28575" cap="flat" cmpd="sng" algn="ctr">
-                  <a:solidFill>
-                    <a:srgbClr val="6EAD45"/>
-                  </a:solidFill>
-                  <a:prstDash val="solid"/>
-                  <a:miter lim="800000"/>
-                </a:ln>
-                <a:effectLst/>
-              </p:spPr>
-              <p:txBody>
-                <a:bodyPr rtlCol="0" anchor="ctr"/>
-                <a:lstStyle/>
-                <a:p>
-                  <a:pPr algn="ctr">
-                    <a:defRPr/>
-                  </a:pPr>
-                  <a:endParaRPr lang="fr-FR" kern="0" dirty="0">
-                    <a:solidFill>
-                      <a:srgbClr val="FFFFFF"/>
-                    </a:solidFill>
-                    <a:latin typeface="Open Sans" panose="020B0606030504020204" pitchFamily="34" charset="0"/>
-                  </a:endParaRPr>
-                </a:p>
-              </p:txBody>
-            </p:sp>
-            <p:pic>
-              <p:nvPicPr>
-                <p:cNvPr id="135" name="Picture 134">
-                  <a:extLst>
-                    <a:ext uri="{FF2B5EF4-FFF2-40B4-BE49-F238E27FC236}">
-                      <a16:creationId xmlns:a16="http://schemas.microsoft.com/office/drawing/2014/main" id="{63C15178-3910-4E9D-ACB0-399F350A698C}"/>
-                    </a:ext>
-                  </a:extLst>
-                </p:cNvPr>
-                <p:cNvPicPr>
-                  <a:picLocks noChangeAspect="1"/>
-                </p:cNvPicPr>
-                <p:nvPr/>
-              </p:nvPicPr>
-              <p:blipFill>
-                <a:blip r:embed="rId4"/>
-                <a:stretch>
-                  <a:fillRect/>
-                </a:stretch>
-              </p:blipFill>
-              <p:spPr>
-                <a:xfrm>
-                  <a:off x="1445738" y="2688464"/>
-                  <a:ext cx="660684" cy="662838"/>
-                </a:xfrm>
-                <a:prstGeom prst="rect">
-                  <a:avLst/>
-                </a:prstGeom>
-                <a:ln>
-                  <a:noFill/>
-                </a:ln>
-              </p:spPr>
-            </p:pic>
-          </p:grpSp>
-        </p:grpSp>
         <p:sp>
           <p:nvSpPr>
-            <p:cNvPr id="129" name="Rectangle 128"/>
+            <p:cNvPr id="132" name="Rectangle 131"/>
             <p:cNvSpPr/>
             <p:nvPr/>
           </p:nvSpPr>
           <p:spPr>
             <a:xfrm>
-              <a:off x="4546090" y="4627557"/>
-              <a:ext cx="1084312" cy="998533"/>
+              <a:off x="3872751" y="5008009"/>
+              <a:ext cx="871306" cy="219744"/>
             </a:xfrm>
             <a:prstGeom prst="rect">
               <a:avLst/>
+            </a:prstGeom>
+            <a:noFill/>
+            <a:ln>
+              <a:noFill/>
+            </a:ln>
+            <a:effectLst/>
+          </p:spPr>
+          <p:style>
+            <a:lnRef idx="2">
+              <a:schemeClr val="dk1">
+                <a:shade val="50000"/>
+              </a:schemeClr>
+            </a:lnRef>
+            <a:fillRef idx="1">
+              <a:schemeClr val="dk1"/>
+            </a:fillRef>
+            <a:effectRef idx="0">
+              <a:schemeClr val="dk1"/>
+            </a:effectRef>
+            <a:fontRef idx="minor">
+              <a:schemeClr val="lt1"/>
+            </a:fontRef>
+          </p:style>
+          <p:txBody>
+            <a:bodyPr rtlCol="0" anchor="t"/>
+            <a:lstStyle/>
+            <a:p>
+              <a:pPr algn="ctr">
+                <a:defRPr/>
+              </a:pPr>
+              <a:r>
+                <a:rPr lang="en-US" sz="1000" b="1" dirty="0">
+                  <a:solidFill>
+                    <a:schemeClr val="tx1"/>
+                  </a:solidFill>
+                  <a:latin typeface="Source Sans Pro" charset="0"/>
+                  <a:ea typeface="Source Sans Pro" charset="0"/>
+                  <a:cs typeface="Source Sans Pro" charset="0"/>
+                </a:rPr>
+                <a:t>MEJ32 Core</a:t>
+              </a:r>
+            </a:p>
+          </p:txBody>
+        </p:sp>
+        <p:cxnSp>
+          <p:nvCxnSpPr>
+            <p:cNvPr id="138" name="Connecteur droit avec flèche 148"/>
+            <p:cNvCxnSpPr/>
+            <p:nvPr/>
+          </p:nvCxnSpPr>
+          <p:spPr>
+            <a:xfrm>
+              <a:off x="6201173" y="4257171"/>
+              <a:ext cx="669" cy="429819"/>
+            </a:xfrm>
+            <a:prstGeom prst="straightConnector1">
+              <a:avLst/>
+            </a:prstGeom>
+            <a:ln>
+              <a:solidFill>
+                <a:schemeClr val="tx2"/>
+              </a:solidFill>
+              <a:tailEnd type="triangle"/>
+            </a:ln>
+          </p:spPr>
+          <p:style>
+            <a:lnRef idx="1">
+              <a:schemeClr val="accent1"/>
+            </a:lnRef>
+            <a:fillRef idx="0">
+              <a:schemeClr val="accent1"/>
+            </a:fillRef>
+            <a:effectRef idx="0">
+              <a:schemeClr val="accent1"/>
+            </a:effectRef>
+            <a:fontRef idx="minor">
+              <a:schemeClr val="tx1"/>
+            </a:fontRef>
+          </p:style>
+        </p:cxnSp>
+        <p:cxnSp>
+          <p:nvCxnSpPr>
+            <p:cNvPr id="155" name="Connecteur droit avec flèche 149"/>
+            <p:cNvCxnSpPr/>
+            <p:nvPr/>
+          </p:nvCxnSpPr>
+          <p:spPr>
+            <a:xfrm>
+              <a:off x="9509630" y="2591432"/>
+              <a:ext cx="0" cy="1235240"/>
+            </a:xfrm>
+            <a:prstGeom prst="straightConnector1">
+              <a:avLst/>
+            </a:prstGeom>
+            <a:ln>
+              <a:solidFill>
+                <a:schemeClr val="tx2"/>
+              </a:solidFill>
+              <a:tailEnd type="triangle"/>
+            </a:ln>
+          </p:spPr>
+          <p:style>
+            <a:lnRef idx="1">
+              <a:schemeClr val="accent1"/>
+            </a:lnRef>
+            <a:fillRef idx="0">
+              <a:schemeClr val="accent1"/>
+            </a:fillRef>
+            <a:effectRef idx="0">
+              <a:schemeClr val="accent1"/>
+            </a:effectRef>
+            <a:fontRef idx="minor">
+              <a:schemeClr val="tx1"/>
+            </a:fontRef>
+          </p:style>
+        </p:cxnSp>
+        <p:sp>
+          <p:nvSpPr>
+            <p:cNvPr id="156" name="ZoneTexte 173"/>
+            <p:cNvSpPr txBox="1"/>
+            <p:nvPr/>
+          </p:nvSpPr>
+          <p:spPr>
+            <a:xfrm>
+              <a:off x="9536777" y="3610518"/>
+              <a:ext cx="683825" cy="246221"/>
+            </a:xfrm>
+            <a:prstGeom prst="rect">
+              <a:avLst/>
+            </a:prstGeom>
+            <a:noFill/>
+          </p:spPr>
+          <p:txBody>
+            <a:bodyPr wrap="square" rtlCol="0">
+              <a:spAutoFit/>
+            </a:bodyPr>
+            <a:lstStyle/>
+            <a:p>
+              <a:pPr>
+                <a:defRPr/>
+              </a:pPr>
+              <a:r>
+                <a:rPr lang="en-US" sz="1000" dirty="0">
+                  <a:solidFill>
+                    <a:srgbClr val="97A7AF"/>
+                  </a:solidFill>
+                </a:rPr>
+                <a:t>(.h, .c)</a:t>
+              </a:r>
+            </a:p>
+          </p:txBody>
+        </p:sp>
+        <p:pic>
+          <p:nvPicPr>
+            <p:cNvPr id="59" name="Picture 58"/>
+            <p:cNvPicPr>
+              <a:picLocks noChangeAspect="1"/>
+            </p:cNvPicPr>
+            <p:nvPr/>
+          </p:nvPicPr>
+          <p:blipFill>
+            <a:blip r:embed="rId4">
+              <a:extLst>
+                <a:ext uri="{28A0092B-C50C-407E-A947-70E740481C1C}">
+                  <a14:useLocalDpi xmlns:a14="http://schemas.microsoft.com/office/drawing/2010/main" val="0"/>
+                </a:ext>
+              </a:extLst>
+            </a:blip>
+            <a:stretch>
+              <a:fillRect/>
+            </a:stretch>
+          </p:blipFill>
+          <p:spPr>
+            <a:xfrm>
+              <a:off x="3964985" y="5235479"/>
+              <a:ext cx="654522" cy="658884"/>
+            </a:xfrm>
+            <a:prstGeom prst="rect">
+              <a:avLst/>
+            </a:prstGeom>
+          </p:spPr>
+        </p:pic>
+        <p:sp>
+          <p:nvSpPr>
+            <p:cNvPr id="3" name="Rounded Rectangle 2"/>
+            <p:cNvSpPr/>
+            <p:nvPr/>
+          </p:nvSpPr>
+          <p:spPr>
+            <a:xfrm>
+              <a:off x="4075508" y="1842561"/>
+              <a:ext cx="2023200" cy="657123"/>
+            </a:xfrm>
+            <a:prstGeom prst="roundRect">
+              <a:avLst>
+                <a:gd name="adj" fmla="val 11196"/>
+              </a:avLst>
             </a:prstGeom>
             <a:solidFill>
               <a:schemeClr val="accent4"/>
             </a:solidFill>
             <a:ln>
-              <a:solidFill>
-                <a:schemeClr val="bg1"/>
-              </a:solidFill>
+              <a:noFill/>
             </a:ln>
             <a:effectLst/>
           </p:spPr>
@@ -34621,44 +34269,61 @@
                 <a:defRPr/>
               </a:pPr>
               <a:r>
-                <a:rPr lang="en-US" sz="1000" b="1" dirty="0">
+                <a:rPr lang="en-US" sz="1000" dirty="0">
                   <a:solidFill>
                     <a:srgbClr val="FFFFFF"/>
                   </a:solidFill>
-                  <a:cs typeface="Arial" panose="020B0604020202020204" pitchFamily="34" charset="0"/>
+                  <a:latin typeface="Source Sans Pro Light" charset="0"/>
+                  <a:ea typeface="Source Sans Pro Light" charset="0"/>
+                  <a:cs typeface="Source Sans Pro Light" charset="0"/>
                 </a:rPr>
-                <a:t>Java Foundation Libraries</a:t>
+                <a:t>Foundation libraries </a:t>
+              </a:r>
+              <a:br>
+                <a:rPr lang="en-US" sz="1000" dirty="0">
+                  <a:solidFill>
+                    <a:srgbClr val="FFFFFF"/>
+                  </a:solidFill>
+                  <a:latin typeface="Source Sans Pro Light" charset="0"/>
+                  <a:ea typeface="Source Sans Pro Light" charset="0"/>
+                  <a:cs typeface="Source Sans Pro Light" charset="0"/>
+                </a:rPr>
+              </a:br>
+              <a:r>
+                <a:rPr lang="en-US" sz="1000" dirty="0">
+                  <a:solidFill>
+                    <a:srgbClr val="FFFFFF"/>
+                  </a:solidFill>
+                  <a:latin typeface="Source Sans Pro Light" charset="0"/>
+                  <a:ea typeface="Source Sans Pro Light" charset="0"/>
+                  <a:cs typeface="Source Sans Pro Light" charset="0"/>
+                </a:rPr>
+                <a:t>Java</a:t>
               </a:r>
             </a:p>
           </p:txBody>
         </p:sp>
         <p:sp>
           <p:nvSpPr>
-            <p:cNvPr id="130" name="Rectangle 129">
-              <a:extLst>
-                <a:ext uri="{FF2B5EF4-FFF2-40B4-BE49-F238E27FC236}">
-                  <a16:creationId xmlns:a16="http://schemas.microsoft.com/office/drawing/2014/main" id="{A3B9DB16-F465-4058-B983-18AC8FD15120}"/>
-                </a:ext>
-              </a:extLst>
-            </p:cNvPr>
+            <p:cNvPr id="61" name="Rounded Rectangle 60"/>
             <p:cNvSpPr/>
             <p:nvPr/>
           </p:nvSpPr>
           <p:spPr>
             <a:xfrm>
-              <a:off x="5824232" y="4624401"/>
-              <a:ext cx="1084312" cy="1000698"/>
+              <a:off x="6292368" y="1842561"/>
+              <a:ext cx="2023200" cy="657123"/>
             </a:xfrm>
-            <a:prstGeom prst="rect">
-              <a:avLst/>
+            <a:prstGeom prst="roundRect">
+              <a:avLst>
+                <a:gd name="adj" fmla="val 11196"/>
+              </a:avLst>
             </a:prstGeom>
             <a:solidFill>
               <a:schemeClr val="accent2"/>
             </a:solidFill>
             <a:ln>
-              <a:solidFill>
-                <a:schemeClr val="bg1"/>
-              </a:solidFill>
+              <a:noFill/>
             </a:ln>
             <a:effectLst/>
           </p:spPr>
@@ -34686,71 +34351,56 @@
                 <a:defRPr/>
               </a:pPr>
               <a:r>
-                <a:rPr lang="en-US" sz="1000" b="1" dirty="0">
+                <a:rPr lang="en-US" sz="1000" dirty="0">
                   <a:solidFill>
                     <a:srgbClr val="FFFFFF"/>
                   </a:solidFill>
-                  <a:cs typeface="Arial" panose="020B0604020202020204" pitchFamily="34" charset="0"/>
+                  <a:latin typeface="Source Sans Pro Light" charset="0"/>
+                  <a:ea typeface="Source Sans Pro Light" charset="0"/>
+                  <a:cs typeface="Source Sans Pro Light" charset="0"/>
                 </a:rPr>
-                <a:t>Simulator + Mockups</a:t>
+                <a:t>Foundation libraries Mockups</a:t>
               </a:r>
             </a:p>
             <a:p>
               <a:pPr algn="ctr">
                 <a:defRPr/>
               </a:pPr>
-              <a:endParaRPr lang="en-US" sz="1000" b="1" dirty="0">
-                <a:solidFill>
-                  <a:srgbClr val="FFFFFF"/>
-                </a:solidFill>
-                <a:cs typeface="Arial" panose="020B0604020202020204" pitchFamily="34" charset="0"/>
-              </a:endParaRPr>
-            </a:p>
-            <a:p>
-              <a:pPr algn="ctr">
-                <a:defRPr/>
-              </a:pPr>
-              <a:endParaRPr lang="en-US" sz="1000" b="1" dirty="0">
-                <a:solidFill>
-                  <a:srgbClr val="FFFFFF"/>
-                </a:solidFill>
-                <a:cs typeface="Arial" panose="020B0604020202020204" pitchFamily="34" charset="0"/>
-              </a:endParaRPr>
-            </a:p>
-            <a:p>
-              <a:pPr algn="ctr">
-                <a:defRPr/>
-              </a:pPr>
-              <a:endParaRPr lang="en-US" sz="1000" b="1" dirty="0">
-                <a:solidFill>
-                  <a:srgbClr val="FFFFFF"/>
-                </a:solidFill>
-                <a:cs typeface="Arial" panose="020B0604020202020204" pitchFamily="34" charset="0"/>
-              </a:endParaRPr>
+              <a:r>
+                <a:rPr lang="en-US" sz="1000" dirty="0">
+                  <a:solidFill>
+                    <a:srgbClr val="FFFFFF"/>
+                  </a:solidFill>
+                  <a:latin typeface="Source Sans Pro Light" charset="0"/>
+                  <a:ea typeface="Source Sans Pro Light" charset="0"/>
+                  <a:cs typeface="Source Sans Pro Light" charset="0"/>
+                </a:rPr>
+                <a:t>Java/C</a:t>
+              </a:r>
             </a:p>
           </p:txBody>
         </p:sp>
         <p:sp>
           <p:nvSpPr>
-            <p:cNvPr id="131" name="Rectangle 130"/>
+            <p:cNvPr id="62" name="Rounded Rectangle 61"/>
             <p:cNvSpPr/>
             <p:nvPr/>
           </p:nvSpPr>
           <p:spPr>
             <a:xfrm>
-              <a:off x="7102374" y="4628548"/>
-              <a:ext cx="1084312" cy="996550"/>
+              <a:off x="8493995" y="1842561"/>
+              <a:ext cx="2023200" cy="657123"/>
             </a:xfrm>
-            <a:prstGeom prst="rect">
-              <a:avLst/>
+            <a:prstGeom prst="roundRect">
+              <a:avLst>
+                <a:gd name="adj" fmla="val 11196"/>
+              </a:avLst>
             </a:prstGeom>
             <a:solidFill>
-              <a:schemeClr val="tx2"/>
+              <a:srgbClr val="FFA300"/>
             </a:solidFill>
             <a:ln>
-              <a:solidFill>
-                <a:schemeClr val="bg1"/>
-              </a:solidFill>
+              <a:noFill/>
             </a:ln>
             <a:effectLst/>
           </p:spPr>
@@ -34778,545 +34428,1013 @@
                 <a:defRPr/>
               </a:pPr>
               <a:r>
-                <a:rPr lang="en-US" sz="1000" b="1" dirty="0">
+                <a:rPr lang="en-US" sz="1000" dirty="0">
                   <a:solidFill>
-                    <a:srgbClr val="FFFFFF"/>
+                    <a:schemeClr val="bg1"/>
                   </a:solidFill>
-                  <a:cs typeface="Arial" panose="020B0604020202020204" pitchFamily="34" charset="0"/>
+                  <a:latin typeface="Source Sans Pro Light" charset="0"/>
+                  <a:ea typeface="Source Sans Pro Light" charset="0"/>
+                  <a:cs typeface="Source Sans Pro Light" charset="0"/>
                 </a:rPr>
-                <a:t>Scripts + Tooling + Documentation</a:t>
+                <a:t>Foundation Libraries Adaptation Layer</a:t>
+              </a:r>
+            </a:p>
+            <a:p>
+              <a:pPr algn="ctr">
+                <a:defRPr/>
+              </a:pPr>
+              <a:r>
+                <a:rPr lang="en-US" sz="1000" dirty="0">
+                  <a:solidFill>
+                    <a:schemeClr val="bg1"/>
+                  </a:solidFill>
+                  <a:latin typeface="Source Sans Pro Light" charset="0"/>
+                  <a:ea typeface="Source Sans Pro Light" charset="0"/>
+                  <a:cs typeface="Source Sans Pro Light" charset="0"/>
+                </a:rPr>
+                <a:t>H</a:t>
               </a:r>
             </a:p>
           </p:txBody>
         </p:sp>
+        <p:sp>
+          <p:nvSpPr>
+            <p:cNvPr id="63" name="Rounded Rectangle 62"/>
+            <p:cNvSpPr/>
+            <p:nvPr/>
+          </p:nvSpPr>
+          <p:spPr>
+            <a:xfrm>
+              <a:off x="1884063" y="1842561"/>
+              <a:ext cx="2023200" cy="657123"/>
+            </a:xfrm>
+            <a:prstGeom prst="roundRect">
+              <a:avLst>
+                <a:gd name="adj" fmla="val 11196"/>
+              </a:avLst>
+            </a:prstGeom>
+            <a:solidFill>
+              <a:schemeClr val="accent1"/>
+            </a:solidFill>
+            <a:ln>
+              <a:noFill/>
+            </a:ln>
+            <a:effectLst/>
+          </p:spPr>
+          <p:style>
+            <a:lnRef idx="2">
+              <a:schemeClr val="dk1">
+                <a:shade val="50000"/>
+              </a:schemeClr>
+            </a:lnRef>
+            <a:fillRef idx="1">
+              <a:schemeClr val="dk1"/>
+            </a:fillRef>
+            <a:effectRef idx="0">
+              <a:schemeClr val="dk1"/>
+            </a:effectRef>
+            <a:fontRef idx="minor">
+              <a:schemeClr val="lt1"/>
+            </a:fontRef>
+          </p:style>
+          <p:txBody>
+            <a:bodyPr rtlCol="0" anchor="ctr"/>
+            <a:lstStyle/>
+            <a:p>
+              <a:pPr algn="ctr">
+                <a:defRPr/>
+              </a:pPr>
+              <a:r>
+                <a:rPr lang="en-US" sz="1000" dirty="0" err="1">
+                  <a:solidFill>
+                    <a:srgbClr val="FFFFFF"/>
+                  </a:solidFill>
+                  <a:latin typeface="Source Sans Pro Light" charset="0"/>
+                  <a:ea typeface="Source Sans Pro Light" charset="0"/>
+                  <a:cs typeface="Source Sans Pro Light" charset="0"/>
+                </a:rPr>
+                <a:t>MicroEJ</a:t>
+              </a:r>
+              <a:r>
+                <a:rPr lang="en-US" sz="1000" dirty="0">
+                  <a:solidFill>
+                    <a:srgbClr val="FFFFFF"/>
+                  </a:solidFill>
+                  <a:latin typeface="Source Sans Pro Light" charset="0"/>
+                  <a:ea typeface="Source Sans Pro Light" charset="0"/>
+                  <a:cs typeface="Source Sans Pro Light" charset="0"/>
+                </a:rPr>
+                <a:t> Architecture </a:t>
+              </a:r>
+            </a:p>
+            <a:p>
+              <a:pPr algn="ctr">
+                <a:defRPr/>
+              </a:pPr>
+              <a:r>
+                <a:rPr lang="en-US" sz="1000" dirty="0">
+                  <a:solidFill>
+                    <a:srgbClr val="FFFFFF"/>
+                  </a:solidFill>
+                  <a:latin typeface="Source Sans Pro Light" charset="0"/>
+                  <a:ea typeface="Source Sans Pro Light" charset="0"/>
+                  <a:cs typeface="Source Sans Pro Light" charset="0"/>
+                </a:rPr>
+                <a:t>(MEJ32 Core + Built-in Foundation Libraries + Simulator + Mockups)</a:t>
+              </a:r>
+            </a:p>
+          </p:txBody>
+        </p:sp>
+        <p:grpSp>
+          <p:nvGrpSpPr>
+            <p:cNvPr id="60" name="Group 59"/>
+            <p:cNvGrpSpPr/>
+            <p:nvPr/>
+          </p:nvGrpSpPr>
+          <p:grpSpPr>
+            <a:xfrm>
+              <a:off x="1830135" y="1817120"/>
+              <a:ext cx="338002" cy="303407"/>
+              <a:chOff x="1830135" y="1909144"/>
+              <a:chExt cx="338002" cy="303407"/>
+            </a:xfrm>
+          </p:grpSpPr>
+          <p:sp>
+            <p:nvSpPr>
+              <p:cNvPr id="74" name="Bande diagonale 37"/>
+              <p:cNvSpPr/>
+              <p:nvPr/>
+            </p:nvSpPr>
+            <p:spPr>
+              <a:xfrm>
+                <a:off x="1888309" y="1932723"/>
+                <a:ext cx="279828" cy="279828"/>
+              </a:xfrm>
+              <a:prstGeom prst="diagStripe">
+                <a:avLst>
+                  <a:gd name="adj" fmla="val 41991"/>
+                </a:avLst>
+              </a:prstGeom>
+              <a:solidFill>
+                <a:schemeClr val="accent1">
+                  <a:lumMod val="75000"/>
+                </a:schemeClr>
+              </a:solidFill>
+              <a:ln>
+                <a:noFill/>
+              </a:ln>
+            </p:spPr>
+            <p:style>
+              <a:lnRef idx="2">
+                <a:schemeClr val="accent1">
+                  <a:shade val="50000"/>
+                </a:schemeClr>
+              </a:lnRef>
+              <a:fillRef idx="1">
+                <a:schemeClr val="accent1"/>
+              </a:fillRef>
+              <a:effectRef idx="0">
+                <a:schemeClr val="accent1"/>
+              </a:effectRef>
+              <a:fontRef idx="minor">
+                <a:schemeClr val="lt1"/>
+              </a:fontRef>
+            </p:style>
+            <p:txBody>
+              <a:bodyPr rtlCol="0" anchor="ctr"/>
+              <a:lstStyle/>
+              <a:p>
+                <a:pPr algn="ctr">
+                  <a:defRPr/>
+                </a:pPr>
+                <a:endParaRPr lang="en-US" dirty="0">
+                  <a:solidFill>
+                    <a:srgbClr val="FFFFFF"/>
+                  </a:solidFill>
+                  <a:latin typeface="Source Sans Pro Light" charset="0"/>
+                  <a:ea typeface="Source Sans Pro Light" charset="0"/>
+                  <a:cs typeface="Source Sans Pro Light" charset="0"/>
+                </a:endParaRPr>
+              </a:p>
+            </p:txBody>
+          </p:sp>
+          <p:sp>
+            <p:nvSpPr>
+              <p:cNvPr id="76" name="ZoneTexte 178"/>
+              <p:cNvSpPr txBox="1"/>
+              <p:nvPr/>
+            </p:nvSpPr>
+            <p:spPr>
+              <a:xfrm rot="18945775">
+                <a:off x="1830135" y="1909144"/>
+                <a:ext cx="333746" cy="230832"/>
+              </a:xfrm>
+              <a:prstGeom prst="rect">
+                <a:avLst/>
+              </a:prstGeom>
+              <a:noFill/>
+            </p:spPr>
+            <p:txBody>
+              <a:bodyPr wrap="none" rtlCol="0">
+                <a:spAutoFit/>
+              </a:bodyPr>
+              <a:lstStyle/>
+              <a:p>
+                <a:pPr>
+                  <a:defRPr/>
+                </a:pPr>
+                <a:r>
+                  <a:rPr lang="en-US" sz="900" dirty="0">
+                    <a:solidFill>
+                      <a:srgbClr val="FFFFFF"/>
+                    </a:solidFill>
+                    <a:latin typeface="Source Sans Pro Light" charset="0"/>
+                    <a:ea typeface="Source Sans Pro Light" charset="0"/>
+                    <a:cs typeface="Source Sans Pro Light" charset="0"/>
+                  </a:rPr>
+                  <a:t>bin</a:t>
+                </a:r>
+                <a:endParaRPr lang="en-US" sz="1000" dirty="0">
+                  <a:solidFill>
+                    <a:srgbClr val="FFFFFF"/>
+                  </a:solidFill>
+                  <a:latin typeface="Source Sans Pro Light" charset="0"/>
+                  <a:ea typeface="Source Sans Pro Light" charset="0"/>
+                  <a:cs typeface="Source Sans Pro Light" charset="0"/>
+                </a:endParaRPr>
+              </a:p>
+            </p:txBody>
+          </p:sp>
+        </p:grpSp>
+        <p:grpSp>
+          <p:nvGrpSpPr>
+            <p:cNvPr id="80" name="Group 79"/>
+            <p:cNvGrpSpPr/>
+            <p:nvPr/>
+          </p:nvGrpSpPr>
+          <p:grpSpPr>
+            <a:xfrm>
+              <a:off x="4011150" y="1816759"/>
+              <a:ext cx="352207" cy="308440"/>
+              <a:chOff x="4014325" y="1909144"/>
+              <a:chExt cx="352207" cy="308440"/>
+            </a:xfrm>
+          </p:grpSpPr>
+          <p:sp>
+            <p:nvSpPr>
+              <p:cNvPr id="81" name="Bande diagonale 192"/>
+              <p:cNvSpPr/>
+              <p:nvPr/>
+            </p:nvSpPr>
+            <p:spPr>
+              <a:xfrm>
+                <a:off x="4086704" y="1937756"/>
+                <a:ext cx="279828" cy="279828"/>
+              </a:xfrm>
+              <a:prstGeom prst="diagStripe">
+                <a:avLst>
+                  <a:gd name="adj" fmla="val 41991"/>
+                </a:avLst>
+              </a:prstGeom>
+              <a:solidFill>
+                <a:schemeClr val="accent5">
+                  <a:lumMod val="75000"/>
+                </a:schemeClr>
+              </a:solidFill>
+              <a:ln>
+                <a:noFill/>
+              </a:ln>
+            </p:spPr>
+            <p:style>
+              <a:lnRef idx="2">
+                <a:schemeClr val="accent1">
+                  <a:shade val="50000"/>
+                </a:schemeClr>
+              </a:lnRef>
+              <a:fillRef idx="1">
+                <a:schemeClr val="accent1"/>
+              </a:fillRef>
+              <a:effectRef idx="0">
+                <a:schemeClr val="accent1"/>
+              </a:effectRef>
+              <a:fontRef idx="minor">
+                <a:schemeClr val="lt1"/>
+              </a:fontRef>
+            </p:style>
+            <p:txBody>
+              <a:bodyPr rtlCol="0" anchor="ctr"/>
+              <a:lstStyle/>
+              <a:p>
+                <a:pPr algn="ctr">
+                  <a:defRPr/>
+                </a:pPr>
+                <a:endParaRPr lang="en-US" dirty="0">
+                  <a:solidFill>
+                    <a:srgbClr val="FFFFFF"/>
+                  </a:solidFill>
+                  <a:latin typeface="Source Sans Pro Light" charset="0"/>
+                  <a:ea typeface="Source Sans Pro Light" charset="0"/>
+                  <a:cs typeface="Source Sans Pro Light" charset="0"/>
+                </a:endParaRPr>
+              </a:p>
+            </p:txBody>
+          </p:sp>
+          <p:sp>
+            <p:nvSpPr>
+              <p:cNvPr id="82" name="ZoneTexte 182"/>
+              <p:cNvSpPr txBox="1"/>
+              <p:nvPr/>
+            </p:nvSpPr>
+            <p:spPr>
+              <a:xfrm rot="18945775">
+                <a:off x="4014325" y="1909144"/>
+                <a:ext cx="317716" cy="230832"/>
+              </a:xfrm>
+              <a:prstGeom prst="rect">
+                <a:avLst/>
+              </a:prstGeom>
+              <a:noFill/>
+            </p:spPr>
+            <p:txBody>
+              <a:bodyPr wrap="none" rtlCol="0">
+                <a:spAutoFit/>
+              </a:bodyPr>
+              <a:lstStyle/>
+              <a:p>
+                <a:pPr>
+                  <a:defRPr/>
+                </a:pPr>
+                <a:r>
+                  <a:rPr lang="en-US" sz="900" dirty="0" err="1">
+                    <a:solidFill>
+                      <a:srgbClr val="FFFFFF"/>
+                    </a:solidFill>
+                    <a:latin typeface="Source Sans Pro Light" charset="0"/>
+                    <a:ea typeface="Source Sans Pro Light" charset="0"/>
+                    <a:cs typeface="Source Sans Pro Light" charset="0"/>
+                  </a:rPr>
+                  <a:t>src</a:t>
+                </a:r>
+                <a:endParaRPr lang="en-US" sz="900" dirty="0">
+                  <a:solidFill>
+                    <a:srgbClr val="FFFFFF"/>
+                  </a:solidFill>
+                  <a:latin typeface="Source Sans Pro Light" charset="0"/>
+                  <a:ea typeface="Source Sans Pro Light" charset="0"/>
+                  <a:cs typeface="Source Sans Pro Light" charset="0"/>
+                </a:endParaRPr>
+              </a:p>
+            </p:txBody>
+          </p:sp>
+        </p:grpSp>
+        <p:grpSp>
+          <p:nvGrpSpPr>
+            <p:cNvPr id="83" name="Group 82"/>
+            <p:cNvGrpSpPr/>
+            <p:nvPr/>
+          </p:nvGrpSpPr>
+          <p:grpSpPr>
+            <a:xfrm>
+              <a:off x="6215514" y="1820291"/>
+              <a:ext cx="355428" cy="303315"/>
+              <a:chOff x="6216968" y="1909144"/>
+              <a:chExt cx="355428" cy="303315"/>
+            </a:xfrm>
+          </p:grpSpPr>
+          <p:sp>
+            <p:nvSpPr>
+              <p:cNvPr id="84" name="Bande diagonale 191">
+                <a:extLst>
+                  <a:ext uri="{FF2B5EF4-FFF2-40B4-BE49-F238E27FC236}">
+                    <a16:creationId xmlns:a16="http://schemas.microsoft.com/office/drawing/2014/main" xmlns="" id="{DAA7A729-6342-4FAC-9943-95D96FF2DD80}"/>
+                  </a:ext>
+                </a:extLst>
+              </p:cNvPr>
+              <p:cNvSpPr/>
+              <p:nvPr/>
+            </p:nvSpPr>
+            <p:spPr>
+              <a:xfrm>
+                <a:off x="6292568" y="1932631"/>
+                <a:ext cx="279828" cy="279828"/>
+              </a:xfrm>
+              <a:prstGeom prst="diagStripe">
+                <a:avLst>
+                  <a:gd name="adj" fmla="val 41991"/>
+                </a:avLst>
+              </a:prstGeom>
+              <a:solidFill>
+                <a:schemeClr val="accent2">
+                  <a:lumMod val="75000"/>
+                </a:schemeClr>
+              </a:solidFill>
+              <a:ln>
+                <a:noFill/>
+              </a:ln>
+            </p:spPr>
+            <p:style>
+              <a:lnRef idx="2">
+                <a:schemeClr val="accent1">
+                  <a:shade val="50000"/>
+                </a:schemeClr>
+              </a:lnRef>
+              <a:fillRef idx="1">
+                <a:schemeClr val="accent1"/>
+              </a:fillRef>
+              <a:effectRef idx="0">
+                <a:schemeClr val="accent1"/>
+              </a:effectRef>
+              <a:fontRef idx="minor">
+                <a:schemeClr val="lt1"/>
+              </a:fontRef>
+            </p:style>
+            <p:txBody>
+              <a:bodyPr rtlCol="0" anchor="ctr"/>
+              <a:lstStyle/>
+              <a:p>
+                <a:pPr algn="ctr">
+                  <a:defRPr/>
+                </a:pPr>
+                <a:endParaRPr lang="en-US" dirty="0">
+                  <a:solidFill>
+                    <a:srgbClr val="FFFFFF"/>
+                  </a:solidFill>
+                  <a:latin typeface="Source Sans Pro Light" charset="0"/>
+                  <a:ea typeface="Source Sans Pro Light" charset="0"/>
+                  <a:cs typeface="Source Sans Pro Light" charset="0"/>
+                </a:endParaRPr>
+              </a:p>
+            </p:txBody>
+          </p:sp>
+          <p:sp>
+            <p:nvSpPr>
+              <p:cNvPr id="85" name="ZoneTexte 180">
+                <a:extLst>
+                  <a:ext uri="{FF2B5EF4-FFF2-40B4-BE49-F238E27FC236}">
+                    <a16:creationId xmlns:a16="http://schemas.microsoft.com/office/drawing/2014/main" xmlns="" id="{5BB884F8-E56F-40DE-BF31-76BF3D0D1275}"/>
+                  </a:ext>
+                </a:extLst>
+              </p:cNvPr>
+              <p:cNvSpPr txBox="1"/>
+              <p:nvPr/>
+            </p:nvSpPr>
+            <p:spPr>
+              <a:xfrm rot="18945775">
+                <a:off x="6216968" y="1909144"/>
+                <a:ext cx="317716" cy="230832"/>
+              </a:xfrm>
+              <a:prstGeom prst="rect">
+                <a:avLst/>
+              </a:prstGeom>
+              <a:noFill/>
+            </p:spPr>
+            <p:txBody>
+              <a:bodyPr wrap="none" rtlCol="0">
+                <a:spAutoFit/>
+              </a:bodyPr>
+              <a:lstStyle/>
+              <a:p>
+                <a:pPr>
+                  <a:defRPr/>
+                </a:pPr>
+                <a:r>
+                  <a:rPr lang="en-US" sz="900" dirty="0" err="1">
+                    <a:solidFill>
+                      <a:srgbClr val="FFFFFF"/>
+                    </a:solidFill>
+                    <a:latin typeface="Source Sans Pro Light" charset="0"/>
+                    <a:ea typeface="Source Sans Pro Light" charset="0"/>
+                    <a:cs typeface="Source Sans Pro Light" charset="0"/>
+                  </a:rPr>
+                  <a:t>src</a:t>
+                </a:r>
+                <a:endParaRPr lang="en-US" sz="900" dirty="0">
+                  <a:solidFill>
+                    <a:srgbClr val="FFFFFF"/>
+                  </a:solidFill>
+                  <a:latin typeface="Source Sans Pro Light" charset="0"/>
+                  <a:ea typeface="Source Sans Pro Light" charset="0"/>
+                  <a:cs typeface="Source Sans Pro Light" charset="0"/>
+                </a:endParaRPr>
+              </a:p>
+            </p:txBody>
+          </p:sp>
+        </p:grpSp>
+        <p:grpSp>
+          <p:nvGrpSpPr>
+            <p:cNvPr id="86" name="Group 85"/>
+            <p:cNvGrpSpPr/>
+            <p:nvPr/>
+          </p:nvGrpSpPr>
+          <p:grpSpPr>
+            <a:xfrm>
+              <a:off x="8416280" y="1818803"/>
+              <a:ext cx="355428" cy="303315"/>
+              <a:chOff x="8422630" y="1909144"/>
+              <a:chExt cx="355428" cy="303315"/>
+            </a:xfrm>
+          </p:grpSpPr>
+          <p:sp>
+            <p:nvSpPr>
+              <p:cNvPr id="87" name="Bande diagonale 191">
+                <a:extLst>
+                  <a:ext uri="{FF2B5EF4-FFF2-40B4-BE49-F238E27FC236}">
+                    <a16:creationId xmlns:a16="http://schemas.microsoft.com/office/drawing/2014/main" xmlns="" id="{DAA7A729-6342-4FAC-9943-95D96FF2DD80}"/>
+                  </a:ext>
+                </a:extLst>
+              </p:cNvPr>
+              <p:cNvSpPr/>
+              <p:nvPr/>
+            </p:nvSpPr>
+            <p:spPr>
+              <a:xfrm>
+                <a:off x="8498230" y="1932631"/>
+                <a:ext cx="279828" cy="279828"/>
+              </a:xfrm>
+              <a:prstGeom prst="diagStripe">
+                <a:avLst>
+                  <a:gd name="adj" fmla="val 41991"/>
+                </a:avLst>
+              </a:prstGeom>
+              <a:solidFill>
+                <a:schemeClr val="accent6">
+                  <a:lumMod val="75000"/>
+                </a:schemeClr>
+              </a:solidFill>
+              <a:ln>
+                <a:noFill/>
+              </a:ln>
+            </p:spPr>
+            <p:style>
+              <a:lnRef idx="2">
+                <a:schemeClr val="accent1">
+                  <a:shade val="50000"/>
+                </a:schemeClr>
+              </a:lnRef>
+              <a:fillRef idx="1">
+                <a:schemeClr val="accent1"/>
+              </a:fillRef>
+              <a:effectRef idx="0">
+                <a:schemeClr val="accent1"/>
+              </a:effectRef>
+              <a:fontRef idx="minor">
+                <a:schemeClr val="lt1"/>
+              </a:fontRef>
+            </p:style>
+            <p:txBody>
+              <a:bodyPr rtlCol="0" anchor="ctr"/>
+              <a:lstStyle/>
+              <a:p>
+                <a:pPr algn="ctr">
+                  <a:defRPr/>
+                </a:pPr>
+                <a:endParaRPr lang="en-US" dirty="0">
+                  <a:solidFill>
+                    <a:srgbClr val="FFFFFF"/>
+                  </a:solidFill>
+                </a:endParaRPr>
+              </a:p>
+            </p:txBody>
+          </p:sp>
+          <p:sp>
+            <p:nvSpPr>
+              <p:cNvPr id="90" name="ZoneTexte 180">
+                <a:extLst>
+                  <a:ext uri="{FF2B5EF4-FFF2-40B4-BE49-F238E27FC236}">
+                    <a16:creationId xmlns:a16="http://schemas.microsoft.com/office/drawing/2014/main" xmlns="" id="{5BB884F8-E56F-40DE-BF31-76BF3D0D1275}"/>
+                  </a:ext>
+                </a:extLst>
+              </p:cNvPr>
+              <p:cNvSpPr txBox="1"/>
+              <p:nvPr/>
+            </p:nvSpPr>
+            <p:spPr>
+              <a:xfrm rot="18945775">
+                <a:off x="8422630" y="1909144"/>
+                <a:ext cx="317716" cy="230832"/>
+              </a:xfrm>
+              <a:prstGeom prst="rect">
+                <a:avLst/>
+              </a:prstGeom>
+              <a:noFill/>
+            </p:spPr>
+            <p:txBody>
+              <a:bodyPr wrap="none" rtlCol="0">
+                <a:spAutoFit/>
+              </a:bodyPr>
+              <a:lstStyle/>
+              <a:p>
+                <a:pPr>
+                  <a:defRPr/>
+                </a:pPr>
+                <a:r>
+                  <a:rPr lang="en-US" sz="900" dirty="0" err="1">
+                    <a:solidFill>
+                      <a:schemeClr val="bg1"/>
+                    </a:solidFill>
+                  </a:rPr>
+                  <a:t>src</a:t>
+                </a:r>
+                <a:endParaRPr lang="en-US" sz="900" dirty="0">
+                  <a:solidFill>
+                    <a:schemeClr val="bg1"/>
+                  </a:solidFill>
+                </a:endParaRPr>
+              </a:p>
+            </p:txBody>
+          </p:sp>
+        </p:grpSp>
         <p:pic>
           <p:nvPicPr>
-            <p:cNvPr id="122" name="Picture 121">
-              <a:extLst>
-                <a:ext uri="{FF2B5EF4-FFF2-40B4-BE49-F238E27FC236}">
-                  <a16:creationId xmlns:a16="http://schemas.microsoft.com/office/drawing/2014/main" id="{5BCA6744-4A46-4A30-9039-D60506470C0D}"/>
-                </a:ext>
-              </a:extLst>
-            </p:cNvPr>
+            <p:cNvPr id="94" name="Picture 93"/>
             <p:cNvPicPr>
               <a:picLocks noChangeAspect="1"/>
             </p:cNvPicPr>
             <p:nvPr/>
           </p:nvPicPr>
           <p:blipFill>
-            <a:blip r:embed="rId5"/>
+            <a:blip r:embed="rId5">
+              <a:extLst>
+                <a:ext uri="{28A0092B-C50C-407E-A947-70E740481C1C}">
+                  <a14:useLocalDpi xmlns:a14="http://schemas.microsoft.com/office/drawing/2010/main" val="0"/>
+                </a:ext>
+              </a:extLst>
+            </a:blip>
+            <a:stretch>
+              <a:fillRect/>
+            </a:stretch>
+          </p:blipFill>
+          <p:spPr>
+            <a:xfrm flipH="1">
+              <a:off x="1749883" y="2293858"/>
+              <a:ext cx="301618" cy="303638"/>
+            </a:xfrm>
+            <a:prstGeom prst="rect">
+              <a:avLst/>
+            </a:prstGeom>
+          </p:spPr>
+        </p:pic>
+        <p:sp>
+          <p:nvSpPr>
+            <p:cNvPr id="54" name="Rounded Rectangle 53"/>
+            <p:cNvSpPr/>
+            <p:nvPr/>
+          </p:nvSpPr>
+          <p:spPr>
+            <a:xfrm>
+              <a:off x="4075508" y="3050831"/>
+              <a:ext cx="2023200" cy="385889"/>
+            </a:xfrm>
+            <a:prstGeom prst="roundRect">
+              <a:avLst/>
+            </a:prstGeom>
+            <a:solidFill>
+              <a:schemeClr val="tx1"/>
+            </a:solidFill>
+            <a:ln>
+              <a:noFill/>
+            </a:ln>
+            <a:effectLst/>
+          </p:spPr>
+          <p:style>
+            <a:lnRef idx="2">
+              <a:schemeClr val="dk1">
+                <a:shade val="50000"/>
+              </a:schemeClr>
+            </a:lnRef>
+            <a:fillRef idx="1">
+              <a:schemeClr val="dk1"/>
+            </a:fillRef>
+            <a:effectRef idx="0">
+              <a:schemeClr val="dk1"/>
+            </a:effectRef>
+            <a:fontRef idx="minor">
+              <a:schemeClr val="lt1"/>
+            </a:fontRef>
+          </p:style>
+          <p:txBody>
+            <a:bodyPr rtlCol="0" anchor="ctr"/>
+            <a:lstStyle/>
+            <a:p>
+              <a:pPr algn="ctr"/>
+              <a:r>
+                <a:rPr lang="en-US" sz="1000">
+                  <a:solidFill>
+                    <a:srgbClr val="FFFFFF"/>
+                  </a:solidFill>
+                  <a:latin typeface="Source Sans Pro Light" charset="0"/>
+                  <a:ea typeface="Source Sans Pro Light" charset="0"/>
+                  <a:cs typeface="Source Sans Pro Light" charset="0"/>
+                </a:rPr>
+                <a:t>Java Compiler</a:t>
+              </a:r>
+              <a:endParaRPr lang="en-US" sz="1000" dirty="0">
+                <a:solidFill>
+                  <a:srgbClr val="FFFFFF"/>
+                </a:solidFill>
+                <a:latin typeface="Source Sans Pro Light" charset="0"/>
+                <a:ea typeface="Source Sans Pro Light" charset="0"/>
+                <a:cs typeface="Source Sans Pro Light" charset="0"/>
+              </a:endParaRPr>
+            </a:p>
+          </p:txBody>
+        </p:sp>
+        <p:sp>
+          <p:nvSpPr>
+            <p:cNvPr id="55" name="Rounded Rectangle 54"/>
+            <p:cNvSpPr/>
+            <p:nvPr/>
+          </p:nvSpPr>
+          <p:spPr>
+            <a:xfrm>
+              <a:off x="6291421" y="3050831"/>
+              <a:ext cx="2023200" cy="385889"/>
+            </a:xfrm>
+            <a:prstGeom prst="roundRect">
+              <a:avLst/>
+            </a:prstGeom>
+            <a:solidFill>
+              <a:schemeClr val="tx1"/>
+            </a:solidFill>
+            <a:ln>
+              <a:noFill/>
+            </a:ln>
+            <a:effectLst/>
+          </p:spPr>
+          <p:style>
+            <a:lnRef idx="2">
+              <a:schemeClr val="dk1">
+                <a:shade val="50000"/>
+              </a:schemeClr>
+            </a:lnRef>
+            <a:fillRef idx="1">
+              <a:schemeClr val="dk1"/>
+            </a:fillRef>
+            <a:effectRef idx="0">
+              <a:schemeClr val="dk1"/>
+            </a:effectRef>
+            <a:fontRef idx="minor">
+              <a:schemeClr val="lt1"/>
+            </a:fontRef>
+          </p:style>
+          <p:txBody>
+            <a:bodyPr rtlCol="0" anchor="ctr"/>
+            <a:lstStyle/>
+            <a:p>
+              <a:pPr algn="ctr"/>
+              <a:r>
+                <a:rPr lang="en-US" sz="1000" dirty="0">
+                  <a:solidFill>
+                    <a:srgbClr val="FFFFFF"/>
+                  </a:solidFill>
+                  <a:latin typeface="Source Sans Pro Light" charset="0"/>
+                  <a:ea typeface="Source Sans Pro Light" charset="0"/>
+                  <a:cs typeface="Source Sans Pro Light" charset="0"/>
+                </a:rPr>
+                <a:t>Java/C Compiler</a:t>
+              </a:r>
+            </a:p>
+          </p:txBody>
+        </p:sp>
+        <p:sp>
+          <p:nvSpPr>
+            <p:cNvPr id="66" name="ZoneTexte 152"/>
+            <p:cNvSpPr txBox="1"/>
+            <p:nvPr/>
+          </p:nvSpPr>
+          <p:spPr>
+            <a:xfrm>
+              <a:off x="5106087" y="3618581"/>
+              <a:ext cx="428322" cy="246221"/>
+            </a:xfrm>
+            <a:prstGeom prst="rect">
+              <a:avLst/>
+            </a:prstGeom>
+            <a:noFill/>
+          </p:spPr>
+          <p:txBody>
+            <a:bodyPr wrap="none" rtlCol="0">
+              <a:spAutoFit/>
+            </a:bodyPr>
+            <a:lstStyle/>
+            <a:p>
+              <a:pPr>
+                <a:defRPr/>
+              </a:pPr>
+              <a:r>
+                <a:rPr lang="en-US" sz="1000" dirty="0">
+                  <a:solidFill>
+                    <a:srgbClr val="97A7AF"/>
+                  </a:solidFill>
+                </a:rPr>
+                <a:t>(.jar)</a:t>
+              </a:r>
+            </a:p>
+          </p:txBody>
+        </p:sp>
+        <p:sp>
+          <p:nvSpPr>
+            <p:cNvPr id="67" name="ZoneTexte 152"/>
+            <p:cNvSpPr txBox="1"/>
+            <p:nvPr/>
+          </p:nvSpPr>
+          <p:spPr>
+            <a:xfrm>
+              <a:off x="7320136" y="3610518"/>
+              <a:ext cx="702436" cy="246221"/>
+            </a:xfrm>
+            <a:prstGeom prst="rect">
+              <a:avLst/>
+            </a:prstGeom>
+            <a:noFill/>
+          </p:spPr>
+          <p:txBody>
+            <a:bodyPr wrap="none" rtlCol="0">
+              <a:spAutoFit/>
+            </a:bodyPr>
+            <a:lstStyle/>
+            <a:p>
+              <a:pPr>
+                <a:defRPr/>
+              </a:pPr>
+              <a:r>
+                <a:rPr lang="en-US" sz="1000" dirty="0">
+                  <a:solidFill>
+                    <a:srgbClr val="97A7AF"/>
+                  </a:solidFill>
+                </a:rPr>
+                <a:t>(.exe, .jar)</a:t>
+              </a:r>
+            </a:p>
+          </p:txBody>
+        </p:sp>
+        <p:sp>
+          <p:nvSpPr>
+            <p:cNvPr id="69" name="Rounded Rectangle 68"/>
+            <p:cNvSpPr/>
+            <p:nvPr/>
+          </p:nvSpPr>
+          <p:spPr>
+            <a:xfrm>
+              <a:off x="1913833" y="3870698"/>
+              <a:ext cx="8603362" cy="385889"/>
+            </a:xfrm>
+            <a:prstGeom prst="roundRect">
+              <a:avLst/>
+            </a:prstGeom>
+            <a:solidFill>
+              <a:schemeClr val="tx1"/>
+            </a:solidFill>
+            <a:ln>
+              <a:noFill/>
+            </a:ln>
+            <a:effectLst/>
+          </p:spPr>
+          <p:style>
+            <a:lnRef idx="2">
+              <a:schemeClr val="dk1">
+                <a:shade val="50000"/>
+              </a:schemeClr>
+            </a:lnRef>
+            <a:fillRef idx="1">
+              <a:schemeClr val="dk1"/>
+            </a:fillRef>
+            <a:effectRef idx="0">
+              <a:schemeClr val="dk1"/>
+            </a:effectRef>
+            <a:fontRef idx="minor">
+              <a:schemeClr val="lt1"/>
+            </a:fontRef>
+          </p:style>
+          <p:txBody>
+            <a:bodyPr rtlCol="0" anchor="ctr"/>
+            <a:lstStyle/>
+            <a:p>
+              <a:pPr algn="ctr">
+                <a:defRPr/>
+              </a:pPr>
+              <a:r>
+                <a:rPr lang="en-US" sz="1000" dirty="0" err="1">
+                  <a:solidFill>
+                    <a:srgbClr val="FFFFFF"/>
+                  </a:solidFill>
+                  <a:latin typeface="Source Sans Pro Light" charset="0"/>
+                  <a:ea typeface="Source Sans Pro Light" charset="0"/>
+                  <a:cs typeface="Source Sans Pro Light" charset="0"/>
+                </a:rPr>
+                <a:t>MicroEJ</a:t>
+              </a:r>
+              <a:r>
+                <a:rPr lang="en-US" sz="1000" dirty="0">
+                  <a:solidFill>
+                    <a:srgbClr val="FFFFFF"/>
+                  </a:solidFill>
+                  <a:latin typeface="Source Sans Pro Light" charset="0"/>
+                  <a:ea typeface="Source Sans Pro Light" charset="0"/>
+                  <a:cs typeface="Source Sans Pro Light" charset="0"/>
+                </a:rPr>
+                <a:t> SDK (Platform Builder)</a:t>
+              </a:r>
+            </a:p>
+          </p:txBody>
+        </p:sp>
+        <p:sp>
+          <p:nvSpPr>
+            <p:cNvPr id="20" name="Rectangle 19"/>
+            <p:cNvSpPr/>
+            <p:nvPr/>
+          </p:nvSpPr>
+          <p:spPr>
+            <a:xfrm>
+              <a:off x="3999601" y="4716516"/>
+              <a:ext cx="4431826" cy="246221"/>
+            </a:xfrm>
+            <a:prstGeom prst="rect">
+              <a:avLst/>
+            </a:prstGeom>
+          </p:spPr>
+          <p:txBody>
+            <a:bodyPr wrap="square">
+              <a:spAutoFit/>
+            </a:bodyPr>
+            <a:lstStyle/>
+            <a:p>
+              <a:pPr algn="ctr"/>
+              <a:r>
+                <a:rPr lang="en-US" sz="1000" dirty="0" err="1">
+                  <a:solidFill>
+                    <a:srgbClr val="FFFFFF"/>
+                  </a:solidFill>
+                  <a:latin typeface="Source Sans Pro Light" charset="0"/>
+                  <a:ea typeface="Source Sans Pro Light" charset="0"/>
+                  <a:cs typeface="Source Sans Pro Light" charset="0"/>
+                </a:rPr>
+                <a:t>MicroEJ</a:t>
+              </a:r>
+              <a:r>
+                <a:rPr lang="en-US" sz="1000" dirty="0">
+                  <a:solidFill>
+                    <a:srgbClr val="FFFFFF"/>
+                  </a:solidFill>
+                  <a:latin typeface="Source Sans Pro Light" charset="0"/>
+                  <a:ea typeface="Source Sans Pro Light" charset="0"/>
+                  <a:cs typeface="Source Sans Pro Light" charset="0"/>
+                </a:rPr>
+                <a:t> </a:t>
+              </a:r>
+              <a:r>
+                <a:rPr lang="en-US" sz="1000" dirty="0" smtClean="0">
+                  <a:solidFill>
+                    <a:srgbClr val="FFFFFF"/>
+                  </a:solidFill>
+                  <a:latin typeface="Source Sans Pro Light" charset="0"/>
+                  <a:ea typeface="Source Sans Pro Light" charset="0"/>
+                  <a:cs typeface="Source Sans Pro Light" charset="0"/>
+                </a:rPr>
+                <a:t>Platform</a:t>
+              </a:r>
+              <a:endParaRPr lang="en-US" sz="1000" dirty="0">
+                <a:solidFill>
+                  <a:srgbClr val="FFFFFF"/>
+                </a:solidFill>
+                <a:latin typeface="Source Sans Pro Light" charset="0"/>
+                <a:ea typeface="Source Sans Pro Light" charset="0"/>
+                <a:cs typeface="Source Sans Pro Light" charset="0"/>
+              </a:endParaRPr>
+            </a:p>
+          </p:txBody>
+        </p:sp>
+        <p:pic>
+          <p:nvPicPr>
+            <p:cNvPr id="68" name="Picture 67"/>
+            <p:cNvPicPr>
+              <a:picLocks noChangeAspect="1"/>
+            </p:cNvPicPr>
+            <p:nvPr/>
+          </p:nvPicPr>
+          <p:blipFill>
+            <a:blip r:embed="rId4">
+              <a:extLst>
+                <a:ext uri="{28A0092B-C50C-407E-A947-70E740481C1C}">
+                  <a14:useLocalDpi xmlns:a14="http://schemas.microsoft.com/office/drawing/2010/main" val="0"/>
+                </a:ext>
+              </a:extLst>
+            </a:blip>
             <a:stretch>
               <a:fillRect/>
             </a:stretch>
           </p:blipFill>
           <p:spPr>
             <a:xfrm>
-              <a:off x="6093049" y="5067612"/>
-              <a:ext cx="576843" cy="480341"/>
+              <a:off x="6740702" y="5500011"/>
+              <a:ext cx="264849" cy="266614"/>
             </a:xfrm>
             <a:prstGeom prst="rect">
               <a:avLst/>
             </a:prstGeom>
           </p:spPr>
         </p:pic>
-        <p:grpSp>
-          <p:nvGrpSpPr>
-            <p:cNvPr id="123" name="Group 122">
-              <a:extLst>
-                <a:ext uri="{FF2B5EF4-FFF2-40B4-BE49-F238E27FC236}">
-                  <a16:creationId xmlns:a16="http://schemas.microsoft.com/office/drawing/2014/main" id="{6A5F38C5-1683-492D-BA61-20700A5D98DC}"/>
-                </a:ext>
-              </a:extLst>
-            </p:cNvPr>
-            <p:cNvGrpSpPr/>
-            <p:nvPr/>
-          </p:nvGrpSpPr>
-          <p:grpSpPr>
-            <a:xfrm>
-              <a:off x="6287349" y="5149019"/>
-              <a:ext cx="170358" cy="166700"/>
-              <a:chOff x="1326080" y="2569883"/>
-              <a:chExt cx="900000" cy="900000"/>
-            </a:xfrm>
-          </p:grpSpPr>
-          <p:sp>
-            <p:nvSpPr>
-              <p:cNvPr id="124" name="Ellipse 60">
-                <a:extLst>
-                  <a:ext uri="{FF2B5EF4-FFF2-40B4-BE49-F238E27FC236}">
-                    <a16:creationId xmlns:a16="http://schemas.microsoft.com/office/drawing/2014/main" id="{9965B8D8-0897-4698-8214-F90DF164EDC0}"/>
-                  </a:ext>
-                </a:extLst>
-              </p:cNvPr>
-              <p:cNvSpPr>
-                <a:spLocks/>
-              </p:cNvSpPr>
-              <p:nvPr/>
-            </p:nvSpPr>
-            <p:spPr>
-              <a:xfrm>
-                <a:off x="1326080" y="2569883"/>
-                <a:ext cx="900000" cy="900000"/>
-              </a:xfrm>
-              <a:prstGeom prst="ellipse">
-                <a:avLst/>
-              </a:prstGeom>
-              <a:solidFill>
-                <a:srgbClr val="FFFFFF"/>
-              </a:solidFill>
-              <a:ln w="28575" cap="flat" cmpd="sng" algn="ctr">
-                <a:solidFill>
-                  <a:srgbClr val="6EAD45"/>
-                </a:solidFill>
-                <a:prstDash val="solid"/>
-                <a:miter lim="800000"/>
-              </a:ln>
-              <a:effectLst/>
-            </p:spPr>
-            <p:txBody>
-              <a:bodyPr rtlCol="0" anchor="ctr"/>
-              <a:lstStyle>
-                <a:defPPr>
-                  <a:defRPr lang="en-US"/>
-                </a:defPPr>
-                <a:lvl1pPr marL="0" algn="l" defTabSz="914400" rtl="0" eaLnBrk="1" latinLnBrk="0" hangingPunct="1">
-                  <a:defRPr sz="1800" kern="1200">
-                    <a:solidFill>
-                      <a:schemeClr val="tx1"/>
-                    </a:solidFill>
-                    <a:latin typeface="+mn-lt"/>
-                    <a:ea typeface="+mn-ea"/>
-                    <a:cs typeface="+mn-cs"/>
-                  </a:defRPr>
-                </a:lvl1pPr>
-                <a:lvl2pPr marL="457200" algn="l" defTabSz="914400" rtl="0" eaLnBrk="1" latinLnBrk="0" hangingPunct="1">
-                  <a:defRPr sz="1800" kern="1200">
-                    <a:solidFill>
-                      <a:schemeClr val="tx1"/>
-                    </a:solidFill>
-                    <a:latin typeface="+mn-lt"/>
-                    <a:ea typeface="+mn-ea"/>
-                    <a:cs typeface="+mn-cs"/>
-                  </a:defRPr>
-                </a:lvl2pPr>
-                <a:lvl3pPr marL="914400" algn="l" defTabSz="914400" rtl="0" eaLnBrk="1" latinLnBrk="0" hangingPunct="1">
-                  <a:defRPr sz="1800" kern="1200">
-                    <a:solidFill>
-                      <a:schemeClr val="tx1"/>
-                    </a:solidFill>
-                    <a:latin typeface="+mn-lt"/>
-                    <a:ea typeface="+mn-ea"/>
-                    <a:cs typeface="+mn-cs"/>
-                  </a:defRPr>
-                </a:lvl3pPr>
-                <a:lvl4pPr marL="1371600" algn="l" defTabSz="914400" rtl="0" eaLnBrk="1" latinLnBrk="0" hangingPunct="1">
-                  <a:defRPr sz="1800" kern="1200">
-                    <a:solidFill>
-                      <a:schemeClr val="tx1"/>
-                    </a:solidFill>
-                    <a:latin typeface="+mn-lt"/>
-                    <a:ea typeface="+mn-ea"/>
-                    <a:cs typeface="+mn-cs"/>
-                  </a:defRPr>
-                </a:lvl4pPr>
-                <a:lvl5pPr marL="1828800" algn="l" defTabSz="914400" rtl="0" eaLnBrk="1" latinLnBrk="0" hangingPunct="1">
-                  <a:defRPr sz="1800" kern="1200">
-                    <a:solidFill>
-                      <a:schemeClr val="tx1"/>
-                    </a:solidFill>
-                    <a:latin typeface="+mn-lt"/>
-                    <a:ea typeface="+mn-ea"/>
-                    <a:cs typeface="+mn-cs"/>
-                  </a:defRPr>
-                </a:lvl5pPr>
-                <a:lvl6pPr marL="2286000" algn="l" defTabSz="914400" rtl="0" eaLnBrk="1" latinLnBrk="0" hangingPunct="1">
-                  <a:defRPr sz="1800" kern="1200">
-                    <a:solidFill>
-                      <a:schemeClr val="tx1"/>
-                    </a:solidFill>
-                    <a:latin typeface="+mn-lt"/>
-                    <a:ea typeface="+mn-ea"/>
-                    <a:cs typeface="+mn-cs"/>
-                  </a:defRPr>
-                </a:lvl6pPr>
-                <a:lvl7pPr marL="2743200" algn="l" defTabSz="914400" rtl="0" eaLnBrk="1" latinLnBrk="0" hangingPunct="1">
-                  <a:defRPr sz="1800" kern="1200">
-                    <a:solidFill>
-                      <a:schemeClr val="tx1"/>
-                    </a:solidFill>
-                    <a:latin typeface="+mn-lt"/>
-                    <a:ea typeface="+mn-ea"/>
-                    <a:cs typeface="+mn-cs"/>
-                  </a:defRPr>
-                </a:lvl7pPr>
-                <a:lvl8pPr marL="3200400" algn="l" defTabSz="914400" rtl="0" eaLnBrk="1" latinLnBrk="0" hangingPunct="1">
-                  <a:defRPr sz="1800" kern="1200">
-                    <a:solidFill>
-                      <a:schemeClr val="tx1"/>
-                    </a:solidFill>
-                    <a:latin typeface="+mn-lt"/>
-                    <a:ea typeface="+mn-ea"/>
-                    <a:cs typeface="+mn-cs"/>
-                  </a:defRPr>
-                </a:lvl8pPr>
-                <a:lvl9pPr marL="3657600" algn="l" defTabSz="914400" rtl="0" eaLnBrk="1" latinLnBrk="0" hangingPunct="1">
-                  <a:defRPr sz="1800" kern="1200">
-                    <a:solidFill>
-                      <a:schemeClr val="tx1"/>
-                    </a:solidFill>
-                    <a:latin typeface="+mn-lt"/>
-                    <a:ea typeface="+mn-ea"/>
-                    <a:cs typeface="+mn-cs"/>
-                  </a:defRPr>
-                </a:lvl9pPr>
-              </a:lstStyle>
-              <a:p>
-                <a:pPr algn="ctr">
-                  <a:defRPr/>
-                </a:pPr>
-                <a:endParaRPr lang="fr-FR" kern="0" dirty="0">
-                  <a:solidFill>
-                    <a:srgbClr val="FFFFFF"/>
-                  </a:solidFill>
-                  <a:latin typeface="Open Sans" panose="020B0606030504020204" pitchFamily="34" charset="0"/>
-                </a:endParaRPr>
-              </a:p>
-            </p:txBody>
-          </p:sp>
-          <p:pic>
-            <p:nvPicPr>
-              <p:cNvPr id="125" name="Picture 124">
-                <a:extLst>
-                  <a:ext uri="{FF2B5EF4-FFF2-40B4-BE49-F238E27FC236}">
-                    <a16:creationId xmlns:a16="http://schemas.microsoft.com/office/drawing/2014/main" id="{EC7D4F88-2273-4065-8D72-AEAA0139872A}"/>
-                  </a:ext>
-                </a:extLst>
-              </p:cNvPr>
-              <p:cNvPicPr>
-                <a:picLocks noChangeAspect="1"/>
-              </p:cNvPicPr>
-              <p:nvPr/>
-            </p:nvPicPr>
-            <p:blipFill>
-              <a:blip r:embed="rId4"/>
-              <a:stretch>
-                <a:fillRect/>
-              </a:stretch>
-            </p:blipFill>
-            <p:spPr>
-              <a:xfrm>
-                <a:off x="1445738" y="2688464"/>
-                <a:ext cx="660684" cy="662838"/>
-              </a:xfrm>
-              <a:prstGeom prst="rect">
-                <a:avLst/>
-              </a:prstGeom>
-              <a:ln>
-                <a:noFill/>
-              </a:ln>
-            </p:spPr>
-          </p:pic>
-        </p:grpSp>
       </p:grpSp>
-      <p:cxnSp>
-        <p:nvCxnSpPr>
-          <p:cNvPr id="138" name="Connecteur droit avec flèche 148"/>
-          <p:cNvCxnSpPr>
-            <a:stCxn id="87" idx="2"/>
-            <a:endCxn id="126" idx="0"/>
-          </p:cNvCxnSpPr>
-          <p:nvPr/>
-        </p:nvCxnSpPr>
-        <p:spPr>
-          <a:xfrm>
-            <a:off x="6201173" y="4257171"/>
-            <a:ext cx="669" cy="429819"/>
-          </a:xfrm>
-          <a:prstGeom prst="straightConnector1">
-            <a:avLst/>
-          </a:prstGeom>
-          <a:ln>
-            <a:solidFill>
-              <a:schemeClr val="tx2"/>
-            </a:solidFill>
-            <a:tailEnd type="triangle"/>
-          </a:ln>
-        </p:spPr>
-        <p:style>
-          <a:lnRef idx="1">
-            <a:schemeClr val="accent1"/>
-          </a:lnRef>
-          <a:fillRef idx="0">
-            <a:schemeClr val="accent1"/>
-          </a:fillRef>
-          <a:effectRef idx="0">
-            <a:schemeClr val="accent1"/>
-          </a:effectRef>
-          <a:fontRef idx="minor">
-            <a:schemeClr val="tx1"/>
-          </a:fontRef>
-        </p:style>
-      </p:cxnSp>
-      <p:sp>
-        <p:nvSpPr>
-          <p:cNvPr id="149" name="Rectangle 148">
-            <a:extLst>
-              <a:ext uri="{FF2B5EF4-FFF2-40B4-BE49-F238E27FC236}">
-                <a16:creationId xmlns:a16="http://schemas.microsoft.com/office/drawing/2014/main" id="{A3B9DB16-F465-4058-B983-18AC8FD15120}"/>
-              </a:ext>
-            </a:extLst>
-          </p:cNvPr>
-          <p:cNvSpPr/>
-          <p:nvPr/>
-        </p:nvSpPr>
-        <p:spPr>
-          <a:xfrm>
-            <a:off x="8498030" y="1932632"/>
-            <a:ext cx="2023200" cy="658800"/>
-          </a:xfrm>
-          <a:prstGeom prst="rect">
-            <a:avLst/>
-          </a:prstGeom>
-          <a:solidFill>
-            <a:srgbClr val="FFA300"/>
-          </a:solidFill>
-          <a:ln>
-            <a:noFill/>
-          </a:ln>
-          <a:effectLst/>
-        </p:spPr>
-        <p:style>
-          <a:lnRef idx="2">
-            <a:schemeClr val="dk1">
-              <a:shade val="50000"/>
-            </a:schemeClr>
-          </a:lnRef>
-          <a:fillRef idx="1">
-            <a:schemeClr val="dk1"/>
-          </a:fillRef>
-          <a:effectRef idx="0">
-            <a:schemeClr val="dk1"/>
-          </a:effectRef>
-          <a:fontRef idx="minor">
-            <a:schemeClr val="lt1"/>
-          </a:fontRef>
-        </p:style>
-        <p:txBody>
-          <a:bodyPr rtlCol="0" anchor="ctr"/>
-          <a:lstStyle/>
-          <a:p>
-            <a:pPr algn="ctr">
-              <a:defRPr/>
-            </a:pPr>
-            <a:r>
-              <a:rPr lang="en-US" sz="1000" b="1" dirty="0">
-                <a:solidFill>
-                  <a:schemeClr val="bg1"/>
-                </a:solidFill>
-                <a:cs typeface="Arial" panose="020B0604020202020204" pitchFamily="34" charset="0"/>
-              </a:rPr>
-              <a:t>Foundation Libraries Adaptation Layer</a:t>
-            </a:r>
-          </a:p>
-          <a:p>
-            <a:pPr algn="ctr">
-              <a:defRPr/>
-            </a:pPr>
-            <a:r>
-              <a:rPr lang="en-US" sz="1000" dirty="0">
-                <a:solidFill>
-                  <a:schemeClr val="bg1"/>
-                </a:solidFill>
-                <a:cs typeface="Arial" panose="020B0604020202020204" pitchFamily="34" charset="0"/>
-              </a:rPr>
-              <a:t>H</a:t>
-            </a:r>
-          </a:p>
-        </p:txBody>
-      </p:sp>
-      <p:sp>
-        <p:nvSpPr>
-          <p:cNvPr id="150" name="Bande diagonale 191">
-            <a:extLst>
-              <a:ext uri="{FF2B5EF4-FFF2-40B4-BE49-F238E27FC236}">
-                <a16:creationId xmlns:a16="http://schemas.microsoft.com/office/drawing/2014/main" id="{DAA7A729-6342-4FAC-9943-95D96FF2DD80}"/>
-              </a:ext>
-            </a:extLst>
-          </p:cNvPr>
-          <p:cNvSpPr/>
-          <p:nvPr/>
-        </p:nvSpPr>
-        <p:spPr>
-          <a:xfrm>
-            <a:off x="8498230" y="1932631"/>
-            <a:ext cx="279828" cy="279828"/>
-          </a:xfrm>
-          <a:prstGeom prst="diagStripe">
-            <a:avLst>
-              <a:gd name="adj" fmla="val 41991"/>
-            </a:avLst>
-          </a:prstGeom>
-          <a:solidFill>
-            <a:schemeClr val="accent6">
-              <a:lumMod val="75000"/>
-            </a:schemeClr>
-          </a:solidFill>
-          <a:ln>
-            <a:noFill/>
-          </a:ln>
-        </p:spPr>
-        <p:style>
-          <a:lnRef idx="2">
-            <a:schemeClr val="accent1">
-              <a:shade val="50000"/>
-            </a:schemeClr>
-          </a:lnRef>
-          <a:fillRef idx="1">
-            <a:schemeClr val="accent1"/>
-          </a:fillRef>
-          <a:effectRef idx="0">
-            <a:schemeClr val="accent1"/>
-          </a:effectRef>
-          <a:fontRef idx="minor">
-            <a:schemeClr val="lt1"/>
-          </a:fontRef>
-        </p:style>
-        <p:txBody>
-          <a:bodyPr rtlCol="0" anchor="ctr"/>
-          <a:lstStyle/>
-          <a:p>
-            <a:pPr algn="ctr">
-              <a:defRPr/>
-            </a:pPr>
-            <a:endParaRPr lang="en-US" dirty="0">
-              <a:solidFill>
-                <a:srgbClr val="FFFFFF"/>
-              </a:solidFill>
-            </a:endParaRPr>
-          </a:p>
-        </p:txBody>
-      </p:sp>
-      <p:sp>
-        <p:nvSpPr>
-          <p:cNvPr id="151" name="ZoneTexte 180">
-            <a:extLst>
-              <a:ext uri="{FF2B5EF4-FFF2-40B4-BE49-F238E27FC236}">
-                <a16:creationId xmlns:a16="http://schemas.microsoft.com/office/drawing/2014/main" id="{5BB884F8-E56F-40DE-BF31-76BF3D0D1275}"/>
-              </a:ext>
-            </a:extLst>
-          </p:cNvPr>
-          <p:cNvSpPr txBox="1"/>
-          <p:nvPr/>
-        </p:nvSpPr>
-        <p:spPr>
-          <a:xfrm rot="18945775">
-            <a:off x="8422630" y="1909144"/>
-            <a:ext cx="317716" cy="230832"/>
-          </a:xfrm>
-          <a:prstGeom prst="rect">
-            <a:avLst/>
-          </a:prstGeom>
-          <a:noFill/>
-        </p:spPr>
-        <p:txBody>
-          <a:bodyPr wrap="none" rtlCol="0">
-            <a:spAutoFit/>
-          </a:bodyPr>
-          <a:lstStyle/>
-          <a:p>
-            <a:pPr>
-              <a:defRPr/>
-            </a:pPr>
-            <a:r>
-              <a:rPr lang="en-US" sz="900" dirty="0" err="1">
-                <a:solidFill>
-                  <a:schemeClr val="bg1"/>
-                </a:solidFill>
-              </a:rPr>
-              <a:t>src</a:t>
-            </a:r>
-            <a:endParaRPr lang="en-US" sz="900" dirty="0">
-              <a:solidFill>
-                <a:schemeClr val="bg1"/>
-              </a:solidFill>
-            </a:endParaRPr>
-          </a:p>
-        </p:txBody>
-      </p:sp>
-      <p:cxnSp>
-        <p:nvCxnSpPr>
-          <p:cNvPr id="155" name="Connecteur droit avec flèche 149"/>
-          <p:cNvCxnSpPr>
-            <a:stCxn id="149" idx="2"/>
-          </p:cNvCxnSpPr>
-          <p:nvPr/>
-        </p:nvCxnSpPr>
-        <p:spPr>
-          <a:xfrm>
-            <a:off x="9509630" y="2591432"/>
-            <a:ext cx="0" cy="1235240"/>
-          </a:xfrm>
-          <a:prstGeom prst="straightConnector1">
-            <a:avLst/>
-          </a:prstGeom>
-          <a:ln>
-            <a:solidFill>
-              <a:schemeClr val="tx2"/>
-            </a:solidFill>
-            <a:tailEnd type="triangle"/>
-          </a:ln>
-        </p:spPr>
-        <p:style>
-          <a:lnRef idx="1">
-            <a:schemeClr val="accent1"/>
-          </a:lnRef>
-          <a:fillRef idx="0">
-            <a:schemeClr val="accent1"/>
-          </a:fillRef>
-          <a:effectRef idx="0">
-            <a:schemeClr val="accent1"/>
-          </a:effectRef>
-          <a:fontRef idx="minor">
-            <a:schemeClr val="tx1"/>
-          </a:fontRef>
-        </p:style>
-      </p:cxnSp>
-      <p:sp>
-        <p:nvSpPr>
-          <p:cNvPr id="156" name="ZoneTexte 173"/>
-          <p:cNvSpPr txBox="1"/>
-          <p:nvPr/>
-        </p:nvSpPr>
-        <p:spPr>
-          <a:xfrm>
-            <a:off x="9645836" y="3610518"/>
-            <a:ext cx="683825" cy="246221"/>
-          </a:xfrm>
-          <a:prstGeom prst="rect">
-            <a:avLst/>
-          </a:prstGeom>
-          <a:noFill/>
-        </p:spPr>
-        <p:txBody>
-          <a:bodyPr wrap="square" rtlCol="0">
-            <a:spAutoFit/>
-          </a:bodyPr>
-          <a:lstStyle/>
-          <a:p>
-            <a:pPr>
-              <a:defRPr/>
-            </a:pPr>
-            <a:r>
-              <a:rPr lang="en-US" sz="1000" dirty="0">
-                <a:solidFill>
-                  <a:srgbClr val="97A7AF"/>
-                </a:solidFill>
-              </a:rPr>
-              <a:t>(.h, .c)</a:t>
-            </a:r>
-          </a:p>
-        </p:txBody>
-      </p:sp>
     </p:spTree>
     <p:extLst>
       <p:ext uri="{BB962C8B-B14F-4D97-AF65-F5344CB8AC3E}">

</xml_diff>